<commit_message>
Updates in the names of all demos.
</commit_message>
<xml_diff>
--- a/inst/extdata/sits-validate-diagram.pptx
+++ b/inst/extdata/sits-validate-diagram.pptx
@@ -3103,7 +3103,7 @@
         </p:nvSpPr>
         <p:spPr>
           <a:xfrm>
-            <a:off x="1835698" y="2011445"/>
+            <a:off x="1931695" y="2011445"/>
             <a:ext cx="1200145" cy="288032"/>
           </a:xfrm>
           <a:prstGeom prst="rect">
@@ -3303,7 +3303,7 @@
         </p:nvSpPr>
         <p:spPr>
           <a:xfrm>
-            <a:off x="2987824" y="3699380"/>
+            <a:off x="3086527" y="3699380"/>
             <a:ext cx="909409" cy="288032"/>
           </a:xfrm>
           <a:prstGeom prst="rect">
@@ -3377,7 +3377,7 @@
             <a:pPr algn="ctr"/>
             <a:r>
               <a:rPr lang="pt-BR" sz="1050" dirty="0" smtClean="0"/>
-              <a:t>Download </a:t>
+              <a:t>Original </a:t>
             </a:r>
             <a:r>
               <a:rPr lang="pt-BR" sz="1050" dirty="0" err="1" smtClean="0"/>
@@ -3385,7 +3385,11 @@
             </a:r>
             <a:r>
               <a:rPr lang="pt-BR" sz="1050" dirty="0" smtClean="0"/>
-              <a:t> data</a:t>
+              <a:t> </a:t>
+            </a:r>
+            <a:r>
+              <a:rPr lang="pt-BR" sz="1050" dirty="0" smtClean="0"/>
+              <a:t>data</a:t>
             </a:r>
             <a:endParaRPr lang="pt-BR" sz="1050" dirty="0"/>
           </a:p>
@@ -3403,7 +3407,7 @@
         <p:spPr>
           <a:xfrm flipV="1">
             <a:off x="899592" y="2155461"/>
-            <a:ext cx="936104" cy="1398"/>
+            <a:ext cx="1032103" cy="1399"/>
           </a:xfrm>
           <a:prstGeom prst="straightConnector1">
             <a:avLst/>
@@ -3465,7 +3469,7 @@
             <a:pPr algn="ctr"/>
             <a:r>
               <a:rPr lang="pt-BR" sz="1050" dirty="0" smtClean="0"/>
-              <a:t>Download </a:t>
+              <a:t>Original </a:t>
             </a:r>
             <a:r>
               <a:rPr lang="pt-BR" sz="1050" dirty="0" err="1" smtClean="0"/>
@@ -3659,7 +3663,7 @@
         </p:nvSpPr>
         <p:spPr>
           <a:xfrm>
-            <a:off x="4146178" y="1767136"/>
+            <a:off x="4334146" y="1767136"/>
             <a:ext cx="885926" cy="768085"/>
           </a:xfrm>
           <a:prstGeom prst="can">
@@ -3715,7 +3719,7 @@
         </p:nvSpPr>
         <p:spPr>
           <a:xfrm>
-            <a:off x="2339752" y="2924945"/>
+            <a:off x="2366447" y="2924945"/>
             <a:ext cx="504056" cy="768085"/>
           </a:xfrm>
           <a:prstGeom prst="can">
@@ -3767,7 +3771,7 @@
         </p:nvSpPr>
         <p:spPr>
           <a:xfrm>
-            <a:off x="2339752" y="4101077"/>
+            <a:off x="2366447" y="4101077"/>
             <a:ext cx="504056" cy="768085"/>
           </a:xfrm>
           <a:prstGeom prst="can">
@@ -3819,7 +3823,7 @@
         </p:nvSpPr>
         <p:spPr>
           <a:xfrm>
-            <a:off x="4139952" y="3461512"/>
+            <a:off x="4327920" y="3461512"/>
             <a:ext cx="885926" cy="768085"/>
           </a:xfrm>
           <a:prstGeom prst="can">
@@ -3886,8 +3890,8 @@
         </p:nvCxnSpPr>
         <p:spPr>
           <a:xfrm flipV="1">
-            <a:off x="3035843" y="2151179"/>
-            <a:ext cx="1110337" cy="4283"/>
+            <a:off x="3131840" y="2151179"/>
+            <a:ext cx="1202306" cy="4282"/>
           </a:xfrm>
           <a:prstGeom prst="straightConnector1">
             <a:avLst/>
@@ -3922,8 +3926,8 @@
         </p:nvCxnSpPr>
         <p:spPr>
           <a:xfrm flipV="1">
-            <a:off x="1979712" y="3308988"/>
-            <a:ext cx="360040" cy="6351"/>
+            <a:off x="1979714" y="3308988"/>
+            <a:ext cx="386733" cy="6350"/>
           </a:xfrm>
           <a:prstGeom prst="straightConnector1">
             <a:avLst/>
@@ -3958,8 +3962,8 @@
         </p:nvCxnSpPr>
         <p:spPr>
           <a:xfrm>
-            <a:off x="1982416" y="4485118"/>
-            <a:ext cx="357336" cy="0"/>
+            <a:off x="1982418" y="4485118"/>
+            <a:ext cx="384029" cy="2"/>
           </a:xfrm>
           <a:prstGeom prst="straightConnector1">
             <a:avLst/>
@@ -3994,8 +3998,8 @@
         </p:nvCxnSpPr>
         <p:spPr>
           <a:xfrm>
-            <a:off x="2843808" y="3308987"/>
-            <a:ext cx="144016" cy="534409"/>
+            <a:off x="2870503" y="3308988"/>
+            <a:ext cx="216024" cy="534408"/>
           </a:xfrm>
           <a:prstGeom prst="straightConnector1">
             <a:avLst/>
@@ -4030,8 +4034,8 @@
         </p:nvCxnSpPr>
         <p:spPr>
           <a:xfrm flipV="1">
-            <a:off x="2843808" y="3843396"/>
-            <a:ext cx="144016" cy="641722"/>
+            <a:off x="2870503" y="3843396"/>
+            <a:ext cx="216024" cy="641724"/>
           </a:xfrm>
           <a:prstGeom prst="straightConnector1">
             <a:avLst/>
@@ -4059,15 +4063,14 @@
         <p:nvCxnSpPr>
           <p:cNvPr id="86" name="Conector de seta reta 85"/>
           <p:cNvCxnSpPr>
-            <a:stCxn id="13" idx="3"/>
             <a:endCxn id="64" idx="2"/>
           </p:cNvCxnSpPr>
           <p:nvPr/>
         </p:nvCxnSpPr>
         <p:spPr>
           <a:xfrm>
-            <a:off x="3897235" y="3843397"/>
-            <a:ext cx="242719" cy="2158"/>
+            <a:off x="3995936" y="3843396"/>
+            <a:ext cx="331984" cy="2159"/>
           </a:xfrm>
           <a:prstGeom prst="straightConnector1">
             <a:avLst/>
@@ -4147,7 +4150,7 @@
         </p:nvSpPr>
         <p:spPr>
           <a:xfrm>
-            <a:off x="4139952" y="4965172"/>
+            <a:off x="4327920" y="4965172"/>
             <a:ext cx="885926" cy="768085"/>
           </a:xfrm>
           <a:prstGeom prst="can">
@@ -4244,7 +4247,7 @@
             <a:pPr algn="ctr"/>
             <a:r>
               <a:rPr lang="pt-BR" sz="1050" dirty="0" err="1" smtClean="0"/>
-              <a:t>classificationTotal</a:t>
+              <a:t>summarizeTotal</a:t>
             </a:r>
             <a:endParaRPr lang="pt-BR" sz="1050" dirty="0"/>
           </a:p>
@@ -4393,8 +4396,8 @@
         </p:nvCxnSpPr>
         <p:spPr>
           <a:xfrm>
-            <a:off x="5025878" y="3845555"/>
-            <a:ext cx="842266" cy="30671"/>
+            <a:off x="5213846" y="3845555"/>
+            <a:ext cx="654300" cy="30670"/>
           </a:xfrm>
           <a:prstGeom prst="straightConnector1">
             <a:avLst/>
@@ -4429,8 +4432,8 @@
         </p:nvCxnSpPr>
         <p:spPr>
           <a:xfrm>
-            <a:off x="5025880" y="3845554"/>
-            <a:ext cx="848195" cy="735574"/>
+            <a:off x="5213846" y="3845555"/>
+            <a:ext cx="660229" cy="735573"/>
           </a:xfrm>
           <a:prstGeom prst="straightConnector1">
             <a:avLst/>
@@ -4465,8 +4468,8 @@
         </p:nvCxnSpPr>
         <p:spPr>
           <a:xfrm flipV="1">
-            <a:off x="5025880" y="4581128"/>
-            <a:ext cx="848195" cy="768086"/>
+            <a:off x="5213846" y="4581128"/>
+            <a:ext cx="660229" cy="768087"/>
           </a:xfrm>
           <a:prstGeom prst="straightConnector1">
             <a:avLst/>
@@ -4501,8 +4504,8 @@
         </p:nvCxnSpPr>
         <p:spPr>
           <a:xfrm flipV="1">
-            <a:off x="5025880" y="3041403"/>
-            <a:ext cx="848195" cy="804152"/>
+            <a:off x="5213846" y="3041402"/>
+            <a:ext cx="660229" cy="804153"/>
           </a:xfrm>
           <a:prstGeom prst="straightConnector1">
             <a:avLst/>
@@ -4537,8 +4540,8 @@
         </p:nvCxnSpPr>
         <p:spPr>
           <a:xfrm>
-            <a:off x="5032106" y="2151179"/>
-            <a:ext cx="841969" cy="890223"/>
+            <a:off x="5220072" y="2151179"/>
+            <a:ext cx="654003" cy="890223"/>
           </a:xfrm>
           <a:prstGeom prst="straightConnector1">
             <a:avLst/>
@@ -4573,8 +4576,8 @@
         </p:nvCxnSpPr>
         <p:spPr>
           <a:xfrm flipV="1">
-            <a:off x="5025879" y="2299478"/>
-            <a:ext cx="842267" cy="1546077"/>
+            <a:off x="5213846" y="2299477"/>
+            <a:ext cx="654301" cy="1546078"/>
           </a:xfrm>
           <a:prstGeom prst="straightConnector1">
             <a:avLst/>
@@ -4609,8 +4612,8 @@
         </p:nvCxnSpPr>
         <p:spPr>
           <a:xfrm>
-            <a:off x="5032106" y="2151179"/>
-            <a:ext cx="836041" cy="148299"/>
+            <a:off x="5220072" y="2151179"/>
+            <a:ext cx="648075" cy="148298"/>
           </a:xfrm>
           <a:prstGeom prst="straightConnector1">
             <a:avLst/>
@@ -4822,7 +4825,7 @@
         </p:nvSpPr>
         <p:spPr>
           <a:xfrm>
-            <a:off x="2354518" y="5229201"/>
+            <a:off x="2381213" y="5229201"/>
             <a:ext cx="993346" cy="768085"/>
           </a:xfrm>
           <a:prstGeom prst="can">
@@ -4888,13 +4891,139 @@
         </p:nvCxnSpPr>
         <p:spPr>
           <a:xfrm>
-            <a:off x="1982416" y="4485119"/>
-            <a:ext cx="372102" cy="1128125"/>
+            <a:off x="1982418" y="4485118"/>
+            <a:ext cx="398795" cy="1128126"/>
           </a:xfrm>
           <a:prstGeom prst="straightConnector1">
             <a:avLst/>
           </a:prstGeom>
           <a:ln w="25400">
+            <a:tailEnd type="arrow"/>
+          </a:ln>
+        </p:spPr>
+        <p:style>
+          <a:lnRef idx="1">
+            <a:schemeClr val="accent1"/>
+          </a:lnRef>
+          <a:fillRef idx="0">
+            <a:schemeClr val="accent1"/>
+          </a:fillRef>
+          <a:effectRef idx="0">
+            <a:schemeClr val="accent1"/>
+          </a:effectRef>
+          <a:fontRef idx="minor">
+            <a:schemeClr val="tx1"/>
+          </a:fontRef>
+        </p:style>
+      </p:cxnSp>
+      <p:sp>
+        <p:nvSpPr>
+          <p:cNvPr id="186" name="Retângulo 185"/>
+          <p:cNvSpPr/>
+          <p:nvPr/>
+        </p:nvSpPr>
+        <p:spPr>
+          <a:xfrm>
+            <a:off x="5868145" y="5205198"/>
+            <a:ext cx="1604039" cy="288032"/>
+          </a:xfrm>
+          <a:prstGeom prst="rect">
+            <a:avLst/>
+          </a:prstGeom>
+        </p:spPr>
+        <p:style>
+          <a:lnRef idx="2">
+            <a:schemeClr val="accent6">
+              <a:shade val="50000"/>
+            </a:schemeClr>
+          </a:lnRef>
+          <a:fillRef idx="1">
+            <a:schemeClr val="accent6"/>
+          </a:fillRef>
+          <a:effectRef idx="0">
+            <a:schemeClr val="accent6"/>
+          </a:effectRef>
+          <a:fontRef idx="minor">
+            <a:schemeClr val="lt1"/>
+          </a:fontRef>
+        </p:style>
+        <p:txBody>
+          <a:bodyPr rtlCol="0" anchor="ctr"/>
+          <a:lstStyle/>
+          <a:p>
+            <a:pPr algn="ctr"/>
+            <a:r>
+              <a:rPr lang="pt-BR" sz="1050" dirty="0" err="1" smtClean="0"/>
+              <a:t>PostProcessing</a:t>
+            </a:r>
+            <a:r>
+              <a:rPr lang="pt-BR" sz="1050" dirty="0" smtClean="0"/>
+              <a:t>*</a:t>
+            </a:r>
+            <a:endParaRPr lang="pt-BR" sz="1050" dirty="0"/>
+          </a:p>
+        </p:txBody>
+      </p:sp>
+      <p:cxnSp>
+        <p:nvCxnSpPr>
+          <p:cNvPr id="187" name="Conector de seta reta 186"/>
+          <p:cNvCxnSpPr>
+            <a:stCxn id="64" idx="4"/>
+            <a:endCxn id="186" idx="1"/>
+          </p:cNvCxnSpPr>
+          <p:nvPr/>
+        </p:nvCxnSpPr>
+        <p:spPr>
+          <a:xfrm>
+            <a:off x="5213846" y="3845555"/>
+            <a:ext cx="654299" cy="1503659"/>
+          </a:xfrm>
+          <a:prstGeom prst="straightConnector1">
+            <a:avLst/>
+          </a:prstGeom>
+          <a:ln w="25400">
+            <a:tailEnd type="arrow"/>
+          </a:ln>
+        </p:spPr>
+        <p:style>
+          <a:lnRef idx="1">
+            <a:schemeClr val="accent1"/>
+          </a:lnRef>
+          <a:fillRef idx="0">
+            <a:schemeClr val="accent1"/>
+          </a:fillRef>
+          <a:effectRef idx="0">
+            <a:schemeClr val="accent1"/>
+          </a:effectRef>
+          <a:fontRef idx="minor">
+            <a:schemeClr val="tx1"/>
+          </a:fontRef>
+        </p:style>
+      </p:cxnSp>
+      <p:cxnSp>
+        <p:nvCxnSpPr>
+          <p:cNvPr id="191" name="Conector em curva 190"/>
+          <p:cNvCxnSpPr>
+            <a:stCxn id="186" idx="3"/>
+            <a:endCxn id="64" idx="3"/>
+          </p:cNvCxnSpPr>
+          <p:nvPr/>
+        </p:nvCxnSpPr>
+        <p:spPr>
+          <a:xfrm flipH="1" flipV="1">
+            <a:off x="4770883" y="4229597"/>
+            <a:ext cx="2701301" cy="1119617"/>
+          </a:xfrm>
+          <a:prstGeom prst="curvedConnector4">
+            <a:avLst>
+              <a:gd name="adj1" fmla="val -15155"/>
+              <a:gd name="adj2" fmla="val 29841"/>
+            </a:avLst>
+          </a:prstGeom>
+          <a:ln w="25400">
+            <a:solidFill>
+              <a:schemeClr val="accent2"/>
+            </a:solidFill>
             <a:tailEnd type="arrow"/>
           </a:ln>
         </p:spPr>

</xml_diff>

<commit_message>
Updating scripts to better connect them.
</commit_message>
<xml_diff>
--- a/inst/extdata/sits-validate-diagram.pptx
+++ b/inst/extdata/sits-validate-diagram.pptx
@@ -3097,18 +3097,2143 @@
       </p:grpSpPr>
       <p:sp>
         <p:nvSpPr>
-          <p:cNvPr id="4" name="Retângulo 3"/>
+          <p:cNvPr id="2" name="Forma livre 1"/>
           <p:cNvSpPr/>
           <p:nvPr/>
         </p:nvSpPr>
         <p:spPr>
           <a:xfrm>
-            <a:off x="1931695" y="2011445"/>
-            <a:ext cx="1200145" cy="288032"/>
+            <a:off x="10633" y="3221665"/>
+            <a:ext cx="8070112" cy="2573670"/>
+          </a:xfrm>
+          <a:custGeom>
+            <a:avLst/>
+            <a:gdLst>
+              <a:gd name="connsiteX0" fmla="*/ 148856 w 8070112"/>
+              <a:gd name="connsiteY0" fmla="*/ 818707 h 2573670"/>
+              <a:gd name="connsiteX1" fmla="*/ 265814 w 8070112"/>
+              <a:gd name="connsiteY1" fmla="*/ 797442 h 2573670"/>
+              <a:gd name="connsiteX2" fmla="*/ 329610 w 8070112"/>
+              <a:gd name="connsiteY2" fmla="*/ 754912 h 2573670"/>
+              <a:gd name="connsiteX3" fmla="*/ 361507 w 8070112"/>
+              <a:gd name="connsiteY3" fmla="*/ 744279 h 2573670"/>
+              <a:gd name="connsiteX4" fmla="*/ 425303 w 8070112"/>
+              <a:gd name="connsiteY4" fmla="*/ 701749 h 2573670"/>
+              <a:gd name="connsiteX5" fmla="*/ 510363 w 8070112"/>
+              <a:gd name="connsiteY5" fmla="*/ 680484 h 2573670"/>
+              <a:gd name="connsiteX6" fmla="*/ 552893 w 8070112"/>
+              <a:gd name="connsiteY6" fmla="*/ 669851 h 2573670"/>
+              <a:gd name="connsiteX7" fmla="*/ 637954 w 8070112"/>
+              <a:gd name="connsiteY7" fmla="*/ 648586 h 2573670"/>
+              <a:gd name="connsiteX8" fmla="*/ 861238 w 8070112"/>
+              <a:gd name="connsiteY8" fmla="*/ 659219 h 2573670"/>
+              <a:gd name="connsiteX9" fmla="*/ 925033 w 8070112"/>
+              <a:gd name="connsiteY9" fmla="*/ 680484 h 2573670"/>
+              <a:gd name="connsiteX10" fmla="*/ 1052624 w 8070112"/>
+              <a:gd name="connsiteY10" fmla="*/ 723014 h 2573670"/>
+              <a:gd name="connsiteX11" fmla="*/ 1127052 w 8070112"/>
+              <a:gd name="connsiteY11" fmla="*/ 744279 h 2573670"/>
+              <a:gd name="connsiteX12" fmla="*/ 1201480 w 8070112"/>
+              <a:gd name="connsiteY12" fmla="*/ 754912 h 2573670"/>
+              <a:gd name="connsiteX13" fmla="*/ 1329070 w 8070112"/>
+              <a:gd name="connsiteY13" fmla="*/ 776177 h 2573670"/>
+              <a:gd name="connsiteX14" fmla="*/ 1392866 w 8070112"/>
+              <a:gd name="connsiteY14" fmla="*/ 786809 h 2573670"/>
+              <a:gd name="connsiteX15" fmla="*/ 1435396 w 8070112"/>
+              <a:gd name="connsiteY15" fmla="*/ 797442 h 2573670"/>
+              <a:gd name="connsiteX16" fmla="*/ 1467293 w 8070112"/>
+              <a:gd name="connsiteY16" fmla="*/ 808075 h 2573670"/>
+              <a:gd name="connsiteX17" fmla="*/ 1520456 w 8070112"/>
+              <a:gd name="connsiteY17" fmla="*/ 818707 h 2573670"/>
+              <a:gd name="connsiteX18" fmla="*/ 1860698 w 8070112"/>
+              <a:gd name="connsiteY18" fmla="*/ 797442 h 2573670"/>
+              <a:gd name="connsiteX19" fmla="*/ 1967024 w 8070112"/>
+              <a:gd name="connsiteY19" fmla="*/ 754912 h 2573670"/>
+              <a:gd name="connsiteX20" fmla="*/ 2009554 w 8070112"/>
+              <a:gd name="connsiteY20" fmla="*/ 744279 h 2573670"/>
+              <a:gd name="connsiteX21" fmla="*/ 2105247 w 8070112"/>
+              <a:gd name="connsiteY21" fmla="*/ 712382 h 2573670"/>
+              <a:gd name="connsiteX22" fmla="*/ 2200940 w 8070112"/>
+              <a:gd name="connsiteY22" fmla="*/ 680484 h 2573670"/>
+              <a:gd name="connsiteX23" fmla="*/ 2232838 w 8070112"/>
+              <a:gd name="connsiteY23" fmla="*/ 669851 h 2573670"/>
+              <a:gd name="connsiteX24" fmla="*/ 2286000 w 8070112"/>
+              <a:gd name="connsiteY24" fmla="*/ 659219 h 2573670"/>
+              <a:gd name="connsiteX25" fmla="*/ 2509284 w 8070112"/>
+              <a:gd name="connsiteY25" fmla="*/ 637954 h 2573670"/>
+              <a:gd name="connsiteX26" fmla="*/ 2573080 w 8070112"/>
+              <a:gd name="connsiteY26" fmla="*/ 627321 h 2573670"/>
+              <a:gd name="connsiteX27" fmla="*/ 2658140 w 8070112"/>
+              <a:gd name="connsiteY27" fmla="*/ 616688 h 2573670"/>
+              <a:gd name="connsiteX28" fmla="*/ 2732568 w 8070112"/>
+              <a:gd name="connsiteY28" fmla="*/ 595423 h 2573670"/>
+              <a:gd name="connsiteX29" fmla="*/ 2785731 w 8070112"/>
+              <a:gd name="connsiteY29" fmla="*/ 584791 h 2573670"/>
+              <a:gd name="connsiteX30" fmla="*/ 2849526 w 8070112"/>
+              <a:gd name="connsiteY30" fmla="*/ 552893 h 2573670"/>
+              <a:gd name="connsiteX31" fmla="*/ 2955852 w 8070112"/>
+              <a:gd name="connsiteY31" fmla="*/ 531628 h 2573670"/>
+              <a:gd name="connsiteX32" fmla="*/ 3051545 w 8070112"/>
+              <a:gd name="connsiteY32" fmla="*/ 478465 h 2573670"/>
+              <a:gd name="connsiteX33" fmla="*/ 3083442 w 8070112"/>
+              <a:gd name="connsiteY33" fmla="*/ 457200 h 2573670"/>
+              <a:gd name="connsiteX34" fmla="*/ 3104707 w 8070112"/>
+              <a:gd name="connsiteY34" fmla="*/ 425302 h 2573670"/>
+              <a:gd name="connsiteX35" fmla="*/ 3136605 w 8070112"/>
+              <a:gd name="connsiteY35" fmla="*/ 414670 h 2573670"/>
+              <a:gd name="connsiteX36" fmla="*/ 3147238 w 8070112"/>
+              <a:gd name="connsiteY36" fmla="*/ 382772 h 2573670"/>
+              <a:gd name="connsiteX37" fmla="*/ 3211033 w 8070112"/>
+              <a:gd name="connsiteY37" fmla="*/ 350875 h 2573670"/>
+              <a:gd name="connsiteX38" fmla="*/ 3296093 w 8070112"/>
+              <a:gd name="connsiteY38" fmla="*/ 287079 h 2573670"/>
+              <a:gd name="connsiteX39" fmla="*/ 3327991 w 8070112"/>
+              <a:gd name="connsiteY39" fmla="*/ 276447 h 2573670"/>
+              <a:gd name="connsiteX40" fmla="*/ 3359889 w 8070112"/>
+              <a:gd name="connsiteY40" fmla="*/ 255182 h 2573670"/>
+              <a:gd name="connsiteX41" fmla="*/ 3391786 w 8070112"/>
+              <a:gd name="connsiteY41" fmla="*/ 244549 h 2573670"/>
+              <a:gd name="connsiteX42" fmla="*/ 3413052 w 8070112"/>
+              <a:gd name="connsiteY42" fmla="*/ 223284 h 2573670"/>
+              <a:gd name="connsiteX43" fmla="*/ 3476847 w 8070112"/>
+              <a:gd name="connsiteY43" fmla="*/ 202019 h 2573670"/>
+              <a:gd name="connsiteX44" fmla="*/ 3615070 w 8070112"/>
+              <a:gd name="connsiteY44" fmla="*/ 180754 h 2573670"/>
+              <a:gd name="connsiteX45" fmla="*/ 3689498 w 8070112"/>
+              <a:gd name="connsiteY45" fmla="*/ 159488 h 2573670"/>
+              <a:gd name="connsiteX46" fmla="*/ 3721396 w 8070112"/>
+              <a:gd name="connsiteY46" fmla="*/ 138223 h 2573670"/>
+              <a:gd name="connsiteX47" fmla="*/ 3817089 w 8070112"/>
+              <a:gd name="connsiteY47" fmla="*/ 127591 h 2573670"/>
+              <a:gd name="connsiteX48" fmla="*/ 3848986 w 8070112"/>
+              <a:gd name="connsiteY48" fmla="*/ 116958 h 2573670"/>
+              <a:gd name="connsiteX49" fmla="*/ 3987210 w 8070112"/>
+              <a:gd name="connsiteY49" fmla="*/ 85061 h 2573670"/>
+              <a:gd name="connsiteX50" fmla="*/ 4019107 w 8070112"/>
+              <a:gd name="connsiteY50" fmla="*/ 74428 h 2573670"/>
+              <a:gd name="connsiteX51" fmla="*/ 4167963 w 8070112"/>
+              <a:gd name="connsiteY51" fmla="*/ 63795 h 2573670"/>
+              <a:gd name="connsiteX52" fmla="*/ 4274289 w 8070112"/>
+              <a:gd name="connsiteY52" fmla="*/ 53163 h 2573670"/>
+              <a:gd name="connsiteX53" fmla="*/ 4359349 w 8070112"/>
+              <a:gd name="connsiteY53" fmla="*/ 31898 h 2573670"/>
+              <a:gd name="connsiteX54" fmla="*/ 4412512 w 8070112"/>
+              <a:gd name="connsiteY54" fmla="*/ 21265 h 2573670"/>
+              <a:gd name="connsiteX55" fmla="*/ 4476307 w 8070112"/>
+              <a:gd name="connsiteY55" fmla="*/ 0 h 2573670"/>
+              <a:gd name="connsiteX56" fmla="*/ 5061098 w 8070112"/>
+              <a:gd name="connsiteY56" fmla="*/ 10633 h 2573670"/>
+              <a:gd name="connsiteX57" fmla="*/ 5092996 w 8070112"/>
+              <a:gd name="connsiteY57" fmla="*/ 21265 h 2573670"/>
+              <a:gd name="connsiteX58" fmla="*/ 5124893 w 8070112"/>
+              <a:gd name="connsiteY58" fmla="*/ 42530 h 2573670"/>
+              <a:gd name="connsiteX59" fmla="*/ 5188689 w 8070112"/>
+              <a:gd name="connsiteY59" fmla="*/ 74428 h 2573670"/>
+              <a:gd name="connsiteX60" fmla="*/ 5241852 w 8070112"/>
+              <a:gd name="connsiteY60" fmla="*/ 138223 h 2573670"/>
+              <a:gd name="connsiteX61" fmla="*/ 5284382 w 8070112"/>
+              <a:gd name="connsiteY61" fmla="*/ 202019 h 2573670"/>
+              <a:gd name="connsiteX62" fmla="*/ 5305647 w 8070112"/>
+              <a:gd name="connsiteY62" fmla="*/ 233916 h 2573670"/>
+              <a:gd name="connsiteX63" fmla="*/ 5369442 w 8070112"/>
+              <a:gd name="connsiteY63" fmla="*/ 318977 h 2573670"/>
+              <a:gd name="connsiteX64" fmla="*/ 5390707 w 8070112"/>
+              <a:gd name="connsiteY64" fmla="*/ 350875 h 2573670"/>
+              <a:gd name="connsiteX65" fmla="*/ 5401340 w 8070112"/>
+              <a:gd name="connsiteY65" fmla="*/ 382772 h 2573670"/>
+              <a:gd name="connsiteX66" fmla="*/ 5443870 w 8070112"/>
+              <a:gd name="connsiteY66" fmla="*/ 467833 h 2573670"/>
+              <a:gd name="connsiteX67" fmla="*/ 5475768 w 8070112"/>
+              <a:gd name="connsiteY67" fmla="*/ 574158 h 2573670"/>
+              <a:gd name="connsiteX68" fmla="*/ 5486400 w 8070112"/>
+              <a:gd name="connsiteY68" fmla="*/ 606056 h 2573670"/>
+              <a:gd name="connsiteX69" fmla="*/ 5497033 w 8070112"/>
+              <a:gd name="connsiteY69" fmla="*/ 659219 h 2573670"/>
+              <a:gd name="connsiteX70" fmla="*/ 5518298 w 8070112"/>
+              <a:gd name="connsiteY70" fmla="*/ 723014 h 2573670"/>
+              <a:gd name="connsiteX71" fmla="*/ 5539563 w 8070112"/>
+              <a:gd name="connsiteY71" fmla="*/ 786809 h 2573670"/>
+              <a:gd name="connsiteX72" fmla="*/ 5560828 w 8070112"/>
+              <a:gd name="connsiteY72" fmla="*/ 861237 h 2573670"/>
+              <a:gd name="connsiteX73" fmla="*/ 5571461 w 8070112"/>
+              <a:gd name="connsiteY73" fmla="*/ 893135 h 2573670"/>
+              <a:gd name="connsiteX74" fmla="*/ 5613991 w 8070112"/>
+              <a:gd name="connsiteY74" fmla="*/ 956930 h 2573670"/>
+              <a:gd name="connsiteX75" fmla="*/ 5635256 w 8070112"/>
+              <a:gd name="connsiteY75" fmla="*/ 988828 h 2573670"/>
+              <a:gd name="connsiteX76" fmla="*/ 5656521 w 8070112"/>
+              <a:gd name="connsiteY76" fmla="*/ 1020726 h 2573670"/>
+              <a:gd name="connsiteX77" fmla="*/ 5699052 w 8070112"/>
+              <a:gd name="connsiteY77" fmla="*/ 1116419 h 2573670"/>
+              <a:gd name="connsiteX78" fmla="*/ 5720317 w 8070112"/>
+              <a:gd name="connsiteY78" fmla="*/ 1307805 h 2573670"/>
+              <a:gd name="connsiteX79" fmla="*/ 5730949 w 8070112"/>
+              <a:gd name="connsiteY79" fmla="*/ 1339702 h 2573670"/>
+              <a:gd name="connsiteX80" fmla="*/ 5762847 w 8070112"/>
+              <a:gd name="connsiteY80" fmla="*/ 1446028 h 2573670"/>
+              <a:gd name="connsiteX81" fmla="*/ 5784112 w 8070112"/>
+              <a:gd name="connsiteY81" fmla="*/ 1477926 h 2573670"/>
+              <a:gd name="connsiteX82" fmla="*/ 5794745 w 8070112"/>
+              <a:gd name="connsiteY82" fmla="*/ 1509823 h 2573670"/>
+              <a:gd name="connsiteX83" fmla="*/ 5826642 w 8070112"/>
+              <a:gd name="connsiteY83" fmla="*/ 1531088 h 2573670"/>
+              <a:gd name="connsiteX84" fmla="*/ 5847907 w 8070112"/>
+              <a:gd name="connsiteY84" fmla="*/ 1552354 h 2573670"/>
+              <a:gd name="connsiteX85" fmla="*/ 5858540 w 8070112"/>
+              <a:gd name="connsiteY85" fmla="*/ 1584251 h 2573670"/>
+              <a:gd name="connsiteX86" fmla="*/ 5922335 w 8070112"/>
+              <a:gd name="connsiteY86" fmla="*/ 1605516 h 2573670"/>
+              <a:gd name="connsiteX87" fmla="*/ 5954233 w 8070112"/>
+              <a:gd name="connsiteY87" fmla="*/ 1616149 h 2573670"/>
+              <a:gd name="connsiteX88" fmla="*/ 6049926 w 8070112"/>
+              <a:gd name="connsiteY88" fmla="*/ 1648047 h 2573670"/>
+              <a:gd name="connsiteX89" fmla="*/ 6081824 w 8070112"/>
+              <a:gd name="connsiteY89" fmla="*/ 1658679 h 2573670"/>
+              <a:gd name="connsiteX90" fmla="*/ 6347638 w 8070112"/>
+              <a:gd name="connsiteY90" fmla="*/ 1669312 h 2573670"/>
+              <a:gd name="connsiteX91" fmla="*/ 6475228 w 8070112"/>
+              <a:gd name="connsiteY91" fmla="*/ 1690577 h 2573670"/>
+              <a:gd name="connsiteX92" fmla="*/ 6507126 w 8070112"/>
+              <a:gd name="connsiteY92" fmla="*/ 1701209 h 2573670"/>
+              <a:gd name="connsiteX93" fmla="*/ 6815470 w 8070112"/>
+              <a:gd name="connsiteY93" fmla="*/ 1711842 h 2573670"/>
+              <a:gd name="connsiteX94" fmla="*/ 7038754 w 8070112"/>
+              <a:gd name="connsiteY94" fmla="*/ 1733107 h 2573670"/>
+              <a:gd name="connsiteX95" fmla="*/ 7091917 w 8070112"/>
+              <a:gd name="connsiteY95" fmla="*/ 1743740 h 2573670"/>
+              <a:gd name="connsiteX96" fmla="*/ 7687340 w 8070112"/>
+              <a:gd name="connsiteY96" fmla="*/ 1754372 h 2573670"/>
+              <a:gd name="connsiteX97" fmla="*/ 7772400 w 8070112"/>
+              <a:gd name="connsiteY97" fmla="*/ 1775637 h 2573670"/>
+              <a:gd name="connsiteX98" fmla="*/ 7804298 w 8070112"/>
+              <a:gd name="connsiteY98" fmla="*/ 1786270 h 2573670"/>
+              <a:gd name="connsiteX99" fmla="*/ 7889359 w 8070112"/>
+              <a:gd name="connsiteY99" fmla="*/ 1807535 h 2573670"/>
+              <a:gd name="connsiteX100" fmla="*/ 7921256 w 8070112"/>
+              <a:gd name="connsiteY100" fmla="*/ 1828800 h 2573670"/>
+              <a:gd name="connsiteX101" fmla="*/ 7985052 w 8070112"/>
+              <a:gd name="connsiteY101" fmla="*/ 1860698 h 2573670"/>
+              <a:gd name="connsiteX102" fmla="*/ 8006317 w 8070112"/>
+              <a:gd name="connsiteY102" fmla="*/ 1892595 h 2573670"/>
+              <a:gd name="connsiteX103" fmla="*/ 8027582 w 8070112"/>
+              <a:gd name="connsiteY103" fmla="*/ 1913861 h 2573670"/>
+              <a:gd name="connsiteX104" fmla="*/ 8059480 w 8070112"/>
+              <a:gd name="connsiteY104" fmla="*/ 2020186 h 2573670"/>
+              <a:gd name="connsiteX105" fmla="*/ 8070112 w 8070112"/>
+              <a:gd name="connsiteY105" fmla="*/ 2052084 h 2573670"/>
+              <a:gd name="connsiteX106" fmla="*/ 8059480 w 8070112"/>
+              <a:gd name="connsiteY106" fmla="*/ 2317898 h 2573670"/>
+              <a:gd name="connsiteX107" fmla="*/ 8048847 w 8070112"/>
+              <a:gd name="connsiteY107" fmla="*/ 2349795 h 2573670"/>
+              <a:gd name="connsiteX108" fmla="*/ 7995684 w 8070112"/>
+              <a:gd name="connsiteY108" fmla="*/ 2392326 h 2573670"/>
+              <a:gd name="connsiteX109" fmla="*/ 7931889 w 8070112"/>
+              <a:gd name="connsiteY109" fmla="*/ 2434856 h 2573670"/>
+              <a:gd name="connsiteX110" fmla="*/ 7899991 w 8070112"/>
+              <a:gd name="connsiteY110" fmla="*/ 2456121 h 2573670"/>
+              <a:gd name="connsiteX111" fmla="*/ 7836196 w 8070112"/>
+              <a:gd name="connsiteY111" fmla="*/ 2477386 h 2573670"/>
+              <a:gd name="connsiteX112" fmla="*/ 7676707 w 8070112"/>
+              <a:gd name="connsiteY112" fmla="*/ 2498651 h 2573670"/>
+              <a:gd name="connsiteX113" fmla="*/ 7602280 w 8070112"/>
+              <a:gd name="connsiteY113" fmla="*/ 2519916 h 2573670"/>
+              <a:gd name="connsiteX114" fmla="*/ 7570382 w 8070112"/>
+              <a:gd name="connsiteY114" fmla="*/ 2530549 h 2573670"/>
+              <a:gd name="connsiteX115" fmla="*/ 7400261 w 8070112"/>
+              <a:gd name="connsiteY115" fmla="*/ 2541182 h 2573670"/>
+              <a:gd name="connsiteX116" fmla="*/ 7315200 w 8070112"/>
+              <a:gd name="connsiteY116" fmla="*/ 2551814 h 2573670"/>
+              <a:gd name="connsiteX117" fmla="*/ 7198242 w 8070112"/>
+              <a:gd name="connsiteY117" fmla="*/ 2562447 h 2573670"/>
+              <a:gd name="connsiteX118" fmla="*/ 7155712 w 8070112"/>
+              <a:gd name="connsiteY118" fmla="*/ 2573079 h 2573670"/>
+              <a:gd name="connsiteX119" fmla="*/ 6613452 w 8070112"/>
+              <a:gd name="connsiteY119" fmla="*/ 2551814 h 2573670"/>
+              <a:gd name="connsiteX120" fmla="*/ 6581554 w 8070112"/>
+              <a:gd name="connsiteY120" fmla="*/ 2541182 h 2573670"/>
+              <a:gd name="connsiteX121" fmla="*/ 6517759 w 8070112"/>
+              <a:gd name="connsiteY121" fmla="*/ 2498651 h 2573670"/>
+              <a:gd name="connsiteX122" fmla="*/ 6453963 w 8070112"/>
+              <a:gd name="connsiteY122" fmla="*/ 2477386 h 2573670"/>
+              <a:gd name="connsiteX123" fmla="*/ 6422066 w 8070112"/>
+              <a:gd name="connsiteY123" fmla="*/ 2456121 h 2573670"/>
+              <a:gd name="connsiteX124" fmla="*/ 6315740 w 8070112"/>
+              <a:gd name="connsiteY124" fmla="*/ 2424223 h 2573670"/>
+              <a:gd name="connsiteX125" fmla="*/ 6283842 w 8070112"/>
+              <a:gd name="connsiteY125" fmla="*/ 2413591 h 2573670"/>
+              <a:gd name="connsiteX126" fmla="*/ 6188149 w 8070112"/>
+              <a:gd name="connsiteY126" fmla="*/ 2360428 h 2573670"/>
+              <a:gd name="connsiteX127" fmla="*/ 6018028 w 8070112"/>
+              <a:gd name="connsiteY127" fmla="*/ 2349795 h 2573670"/>
+              <a:gd name="connsiteX128" fmla="*/ 5922335 w 8070112"/>
+              <a:gd name="connsiteY128" fmla="*/ 2328530 h 2573670"/>
+              <a:gd name="connsiteX129" fmla="*/ 5837275 w 8070112"/>
+              <a:gd name="connsiteY129" fmla="*/ 2307265 h 2573670"/>
+              <a:gd name="connsiteX130" fmla="*/ 5720317 w 8070112"/>
+              <a:gd name="connsiteY130" fmla="*/ 2211572 h 2573670"/>
+              <a:gd name="connsiteX131" fmla="*/ 5677786 w 8070112"/>
+              <a:gd name="connsiteY131" fmla="*/ 2158409 h 2573670"/>
+              <a:gd name="connsiteX132" fmla="*/ 5667154 w 8070112"/>
+              <a:gd name="connsiteY132" fmla="*/ 2126512 h 2573670"/>
+              <a:gd name="connsiteX133" fmla="*/ 5603359 w 8070112"/>
+              <a:gd name="connsiteY133" fmla="*/ 2073349 h 2573670"/>
+              <a:gd name="connsiteX134" fmla="*/ 5560828 w 8070112"/>
+              <a:gd name="connsiteY134" fmla="*/ 2020186 h 2573670"/>
+              <a:gd name="connsiteX135" fmla="*/ 5528931 w 8070112"/>
+              <a:gd name="connsiteY135" fmla="*/ 1998921 h 2573670"/>
+              <a:gd name="connsiteX136" fmla="*/ 5475768 w 8070112"/>
+              <a:gd name="connsiteY136" fmla="*/ 1956391 h 2573670"/>
+              <a:gd name="connsiteX137" fmla="*/ 5454503 w 8070112"/>
+              <a:gd name="connsiteY137" fmla="*/ 1924493 h 2573670"/>
+              <a:gd name="connsiteX138" fmla="*/ 5422605 w 8070112"/>
+              <a:gd name="connsiteY138" fmla="*/ 1892595 h 2573670"/>
+              <a:gd name="connsiteX139" fmla="*/ 5390707 w 8070112"/>
+              <a:gd name="connsiteY139" fmla="*/ 1850065 h 2573670"/>
+              <a:gd name="connsiteX140" fmla="*/ 5337545 w 8070112"/>
+              <a:gd name="connsiteY140" fmla="*/ 1796902 h 2573670"/>
+              <a:gd name="connsiteX141" fmla="*/ 5316280 w 8070112"/>
+              <a:gd name="connsiteY141" fmla="*/ 1765005 h 2573670"/>
+              <a:gd name="connsiteX142" fmla="*/ 5263117 w 8070112"/>
+              <a:gd name="connsiteY142" fmla="*/ 1669312 h 2573670"/>
+              <a:gd name="connsiteX143" fmla="*/ 5199321 w 8070112"/>
+              <a:gd name="connsiteY143" fmla="*/ 1637414 h 2573670"/>
+              <a:gd name="connsiteX144" fmla="*/ 5092996 w 8070112"/>
+              <a:gd name="connsiteY144" fmla="*/ 1605516 h 2573670"/>
+              <a:gd name="connsiteX145" fmla="*/ 5029200 w 8070112"/>
+              <a:gd name="connsiteY145" fmla="*/ 1573619 h 2573670"/>
+              <a:gd name="connsiteX146" fmla="*/ 4965405 w 8070112"/>
+              <a:gd name="connsiteY146" fmla="*/ 1541721 h 2573670"/>
+              <a:gd name="connsiteX147" fmla="*/ 4901610 w 8070112"/>
+              <a:gd name="connsiteY147" fmla="*/ 1509823 h 2573670"/>
+              <a:gd name="connsiteX148" fmla="*/ 4880345 w 8070112"/>
+              <a:gd name="connsiteY148" fmla="*/ 1477926 h 2573670"/>
+              <a:gd name="connsiteX149" fmla="*/ 4816549 w 8070112"/>
+              <a:gd name="connsiteY149" fmla="*/ 1446028 h 2573670"/>
+              <a:gd name="connsiteX150" fmla="*/ 4795284 w 8070112"/>
+              <a:gd name="connsiteY150" fmla="*/ 1414130 h 2573670"/>
+              <a:gd name="connsiteX151" fmla="*/ 4731489 w 8070112"/>
+              <a:gd name="connsiteY151" fmla="*/ 1382233 h 2573670"/>
+              <a:gd name="connsiteX152" fmla="*/ 4667693 w 8070112"/>
+              <a:gd name="connsiteY152" fmla="*/ 1339702 h 2573670"/>
+              <a:gd name="connsiteX153" fmla="*/ 4540103 w 8070112"/>
+              <a:gd name="connsiteY153" fmla="*/ 1297172 h 2573670"/>
+              <a:gd name="connsiteX154" fmla="*/ 4508205 w 8070112"/>
+              <a:gd name="connsiteY154" fmla="*/ 1286540 h 2573670"/>
+              <a:gd name="connsiteX155" fmla="*/ 4476307 w 8070112"/>
+              <a:gd name="connsiteY155" fmla="*/ 1275907 h 2573670"/>
+              <a:gd name="connsiteX156" fmla="*/ 4401880 w 8070112"/>
+              <a:gd name="connsiteY156" fmla="*/ 1265275 h 2573670"/>
+              <a:gd name="connsiteX157" fmla="*/ 3891517 w 8070112"/>
+              <a:gd name="connsiteY157" fmla="*/ 1275907 h 2573670"/>
+              <a:gd name="connsiteX158" fmla="*/ 3827721 w 8070112"/>
+              <a:gd name="connsiteY158" fmla="*/ 1307805 h 2573670"/>
+              <a:gd name="connsiteX159" fmla="*/ 3732028 w 8070112"/>
+              <a:gd name="connsiteY159" fmla="*/ 1329070 h 2573670"/>
+              <a:gd name="connsiteX160" fmla="*/ 3668233 w 8070112"/>
+              <a:gd name="connsiteY160" fmla="*/ 1350335 h 2573670"/>
+              <a:gd name="connsiteX161" fmla="*/ 3646968 w 8070112"/>
+              <a:gd name="connsiteY161" fmla="*/ 1382233 h 2573670"/>
+              <a:gd name="connsiteX162" fmla="*/ 3540642 w 8070112"/>
+              <a:gd name="connsiteY162" fmla="*/ 1403498 h 2573670"/>
+              <a:gd name="connsiteX163" fmla="*/ 3519377 w 8070112"/>
+              <a:gd name="connsiteY163" fmla="*/ 1435395 h 2573670"/>
+              <a:gd name="connsiteX164" fmla="*/ 3476847 w 8070112"/>
+              <a:gd name="connsiteY164" fmla="*/ 1456661 h 2573670"/>
+              <a:gd name="connsiteX165" fmla="*/ 3444949 w 8070112"/>
+              <a:gd name="connsiteY165" fmla="*/ 1477926 h 2573670"/>
+              <a:gd name="connsiteX166" fmla="*/ 3402419 w 8070112"/>
+              <a:gd name="connsiteY166" fmla="*/ 1509823 h 2573670"/>
+              <a:gd name="connsiteX167" fmla="*/ 3370521 w 8070112"/>
+              <a:gd name="connsiteY167" fmla="*/ 1520456 h 2573670"/>
+              <a:gd name="connsiteX168" fmla="*/ 3306726 w 8070112"/>
+              <a:gd name="connsiteY168" fmla="*/ 1562986 h 2573670"/>
+              <a:gd name="connsiteX169" fmla="*/ 3274828 w 8070112"/>
+              <a:gd name="connsiteY169" fmla="*/ 1584251 h 2573670"/>
+              <a:gd name="connsiteX170" fmla="*/ 3242931 w 8070112"/>
+              <a:gd name="connsiteY170" fmla="*/ 1605516 h 2573670"/>
+              <a:gd name="connsiteX171" fmla="*/ 3221666 w 8070112"/>
+              <a:gd name="connsiteY171" fmla="*/ 1626782 h 2573670"/>
+              <a:gd name="connsiteX172" fmla="*/ 3125973 w 8070112"/>
+              <a:gd name="connsiteY172" fmla="*/ 1658679 h 2573670"/>
+              <a:gd name="connsiteX173" fmla="*/ 3062177 w 8070112"/>
+              <a:gd name="connsiteY173" fmla="*/ 1679944 h 2573670"/>
+              <a:gd name="connsiteX174" fmla="*/ 3030280 w 8070112"/>
+              <a:gd name="connsiteY174" fmla="*/ 1690577 h 2573670"/>
+              <a:gd name="connsiteX175" fmla="*/ 2902689 w 8070112"/>
+              <a:gd name="connsiteY175" fmla="*/ 1711842 h 2573670"/>
+              <a:gd name="connsiteX176" fmla="*/ 2838893 w 8070112"/>
+              <a:gd name="connsiteY176" fmla="*/ 1754372 h 2573670"/>
+              <a:gd name="connsiteX177" fmla="*/ 2679405 w 8070112"/>
+              <a:gd name="connsiteY177" fmla="*/ 1807535 h 2573670"/>
+              <a:gd name="connsiteX178" fmla="*/ 2583712 w 8070112"/>
+              <a:gd name="connsiteY178" fmla="*/ 1839433 h 2573670"/>
+              <a:gd name="connsiteX179" fmla="*/ 2551814 w 8070112"/>
+              <a:gd name="connsiteY179" fmla="*/ 1850065 h 2573670"/>
+              <a:gd name="connsiteX180" fmla="*/ 2509284 w 8070112"/>
+              <a:gd name="connsiteY180" fmla="*/ 1860698 h 2573670"/>
+              <a:gd name="connsiteX181" fmla="*/ 2434856 w 8070112"/>
+              <a:gd name="connsiteY181" fmla="*/ 1881963 h 2573670"/>
+              <a:gd name="connsiteX182" fmla="*/ 2381693 w 8070112"/>
+              <a:gd name="connsiteY182" fmla="*/ 1892595 h 2573670"/>
+              <a:gd name="connsiteX183" fmla="*/ 1796903 w 8070112"/>
+              <a:gd name="connsiteY183" fmla="*/ 1913861 h 2573670"/>
+              <a:gd name="connsiteX184" fmla="*/ 1754373 w 8070112"/>
+              <a:gd name="connsiteY184" fmla="*/ 1924493 h 2573670"/>
+              <a:gd name="connsiteX185" fmla="*/ 1722475 w 8070112"/>
+              <a:gd name="connsiteY185" fmla="*/ 1935126 h 2573670"/>
+              <a:gd name="connsiteX186" fmla="*/ 1584252 w 8070112"/>
+              <a:gd name="connsiteY186" fmla="*/ 1967023 h 2573670"/>
+              <a:gd name="connsiteX187" fmla="*/ 765545 w 8070112"/>
+              <a:gd name="connsiteY187" fmla="*/ 1945758 h 2573670"/>
+              <a:gd name="connsiteX188" fmla="*/ 723014 w 8070112"/>
+              <a:gd name="connsiteY188" fmla="*/ 1935126 h 2573670"/>
+              <a:gd name="connsiteX189" fmla="*/ 648586 w 8070112"/>
+              <a:gd name="connsiteY189" fmla="*/ 1924493 h 2573670"/>
+              <a:gd name="connsiteX190" fmla="*/ 563526 w 8070112"/>
+              <a:gd name="connsiteY190" fmla="*/ 1903228 h 2573670"/>
+              <a:gd name="connsiteX191" fmla="*/ 520996 w 8070112"/>
+              <a:gd name="connsiteY191" fmla="*/ 1892595 h 2573670"/>
+              <a:gd name="connsiteX192" fmla="*/ 393405 w 8070112"/>
+              <a:gd name="connsiteY192" fmla="*/ 1881963 h 2573670"/>
+              <a:gd name="connsiteX193" fmla="*/ 287080 w 8070112"/>
+              <a:gd name="connsiteY193" fmla="*/ 1850065 h 2573670"/>
+              <a:gd name="connsiteX194" fmla="*/ 255182 w 8070112"/>
+              <a:gd name="connsiteY194" fmla="*/ 1839433 h 2573670"/>
+              <a:gd name="connsiteX195" fmla="*/ 191386 w 8070112"/>
+              <a:gd name="connsiteY195" fmla="*/ 1796902 h 2573670"/>
+              <a:gd name="connsiteX196" fmla="*/ 159489 w 8070112"/>
+              <a:gd name="connsiteY196" fmla="*/ 1775637 h 2573670"/>
+              <a:gd name="connsiteX197" fmla="*/ 138224 w 8070112"/>
+              <a:gd name="connsiteY197" fmla="*/ 1743740 h 2573670"/>
+              <a:gd name="connsiteX198" fmla="*/ 85061 w 8070112"/>
+              <a:gd name="connsiteY198" fmla="*/ 1701209 h 2573670"/>
+              <a:gd name="connsiteX199" fmla="*/ 53163 w 8070112"/>
+              <a:gd name="connsiteY199" fmla="*/ 1637414 h 2573670"/>
+              <a:gd name="connsiteX200" fmla="*/ 31898 w 8070112"/>
+              <a:gd name="connsiteY200" fmla="*/ 1605516 h 2573670"/>
+              <a:gd name="connsiteX201" fmla="*/ 10633 w 8070112"/>
+              <a:gd name="connsiteY201" fmla="*/ 1541721 h 2573670"/>
+              <a:gd name="connsiteX202" fmla="*/ 0 w 8070112"/>
+              <a:gd name="connsiteY202" fmla="*/ 1509823 h 2573670"/>
+              <a:gd name="connsiteX203" fmla="*/ 10633 w 8070112"/>
+              <a:gd name="connsiteY203" fmla="*/ 1435395 h 2573670"/>
+              <a:gd name="connsiteX204" fmla="*/ 21266 w 8070112"/>
+              <a:gd name="connsiteY204" fmla="*/ 1169582 h 2573670"/>
+              <a:gd name="connsiteX205" fmla="*/ 42531 w 8070112"/>
+              <a:gd name="connsiteY205" fmla="*/ 1105786 h 2573670"/>
+              <a:gd name="connsiteX206" fmla="*/ 53163 w 8070112"/>
+              <a:gd name="connsiteY206" fmla="*/ 978195 h 2573670"/>
+              <a:gd name="connsiteX207" fmla="*/ 95693 w 8070112"/>
+              <a:gd name="connsiteY207" fmla="*/ 914400 h 2573670"/>
+              <a:gd name="connsiteX208" fmla="*/ 106326 w 8070112"/>
+              <a:gd name="connsiteY208" fmla="*/ 882502 h 2573670"/>
+              <a:gd name="connsiteX209" fmla="*/ 138224 w 8070112"/>
+              <a:gd name="connsiteY209" fmla="*/ 861237 h 2573670"/>
+              <a:gd name="connsiteX210" fmla="*/ 148856 w 8070112"/>
+              <a:gd name="connsiteY210" fmla="*/ 818707 h 2573670"/>
+            </a:gdLst>
+            <a:ahLst/>
+            <a:cxnLst>
+              <a:cxn ang="0">
+                <a:pos x="connsiteX0" y="connsiteY0"/>
+              </a:cxn>
+              <a:cxn ang="0">
+                <a:pos x="connsiteX1" y="connsiteY1"/>
+              </a:cxn>
+              <a:cxn ang="0">
+                <a:pos x="connsiteX2" y="connsiteY2"/>
+              </a:cxn>
+              <a:cxn ang="0">
+                <a:pos x="connsiteX3" y="connsiteY3"/>
+              </a:cxn>
+              <a:cxn ang="0">
+                <a:pos x="connsiteX4" y="connsiteY4"/>
+              </a:cxn>
+              <a:cxn ang="0">
+                <a:pos x="connsiteX5" y="connsiteY5"/>
+              </a:cxn>
+              <a:cxn ang="0">
+                <a:pos x="connsiteX6" y="connsiteY6"/>
+              </a:cxn>
+              <a:cxn ang="0">
+                <a:pos x="connsiteX7" y="connsiteY7"/>
+              </a:cxn>
+              <a:cxn ang="0">
+                <a:pos x="connsiteX8" y="connsiteY8"/>
+              </a:cxn>
+              <a:cxn ang="0">
+                <a:pos x="connsiteX9" y="connsiteY9"/>
+              </a:cxn>
+              <a:cxn ang="0">
+                <a:pos x="connsiteX10" y="connsiteY10"/>
+              </a:cxn>
+              <a:cxn ang="0">
+                <a:pos x="connsiteX11" y="connsiteY11"/>
+              </a:cxn>
+              <a:cxn ang="0">
+                <a:pos x="connsiteX12" y="connsiteY12"/>
+              </a:cxn>
+              <a:cxn ang="0">
+                <a:pos x="connsiteX13" y="connsiteY13"/>
+              </a:cxn>
+              <a:cxn ang="0">
+                <a:pos x="connsiteX14" y="connsiteY14"/>
+              </a:cxn>
+              <a:cxn ang="0">
+                <a:pos x="connsiteX15" y="connsiteY15"/>
+              </a:cxn>
+              <a:cxn ang="0">
+                <a:pos x="connsiteX16" y="connsiteY16"/>
+              </a:cxn>
+              <a:cxn ang="0">
+                <a:pos x="connsiteX17" y="connsiteY17"/>
+              </a:cxn>
+              <a:cxn ang="0">
+                <a:pos x="connsiteX18" y="connsiteY18"/>
+              </a:cxn>
+              <a:cxn ang="0">
+                <a:pos x="connsiteX19" y="connsiteY19"/>
+              </a:cxn>
+              <a:cxn ang="0">
+                <a:pos x="connsiteX20" y="connsiteY20"/>
+              </a:cxn>
+              <a:cxn ang="0">
+                <a:pos x="connsiteX21" y="connsiteY21"/>
+              </a:cxn>
+              <a:cxn ang="0">
+                <a:pos x="connsiteX22" y="connsiteY22"/>
+              </a:cxn>
+              <a:cxn ang="0">
+                <a:pos x="connsiteX23" y="connsiteY23"/>
+              </a:cxn>
+              <a:cxn ang="0">
+                <a:pos x="connsiteX24" y="connsiteY24"/>
+              </a:cxn>
+              <a:cxn ang="0">
+                <a:pos x="connsiteX25" y="connsiteY25"/>
+              </a:cxn>
+              <a:cxn ang="0">
+                <a:pos x="connsiteX26" y="connsiteY26"/>
+              </a:cxn>
+              <a:cxn ang="0">
+                <a:pos x="connsiteX27" y="connsiteY27"/>
+              </a:cxn>
+              <a:cxn ang="0">
+                <a:pos x="connsiteX28" y="connsiteY28"/>
+              </a:cxn>
+              <a:cxn ang="0">
+                <a:pos x="connsiteX29" y="connsiteY29"/>
+              </a:cxn>
+              <a:cxn ang="0">
+                <a:pos x="connsiteX30" y="connsiteY30"/>
+              </a:cxn>
+              <a:cxn ang="0">
+                <a:pos x="connsiteX31" y="connsiteY31"/>
+              </a:cxn>
+              <a:cxn ang="0">
+                <a:pos x="connsiteX32" y="connsiteY32"/>
+              </a:cxn>
+              <a:cxn ang="0">
+                <a:pos x="connsiteX33" y="connsiteY33"/>
+              </a:cxn>
+              <a:cxn ang="0">
+                <a:pos x="connsiteX34" y="connsiteY34"/>
+              </a:cxn>
+              <a:cxn ang="0">
+                <a:pos x="connsiteX35" y="connsiteY35"/>
+              </a:cxn>
+              <a:cxn ang="0">
+                <a:pos x="connsiteX36" y="connsiteY36"/>
+              </a:cxn>
+              <a:cxn ang="0">
+                <a:pos x="connsiteX37" y="connsiteY37"/>
+              </a:cxn>
+              <a:cxn ang="0">
+                <a:pos x="connsiteX38" y="connsiteY38"/>
+              </a:cxn>
+              <a:cxn ang="0">
+                <a:pos x="connsiteX39" y="connsiteY39"/>
+              </a:cxn>
+              <a:cxn ang="0">
+                <a:pos x="connsiteX40" y="connsiteY40"/>
+              </a:cxn>
+              <a:cxn ang="0">
+                <a:pos x="connsiteX41" y="connsiteY41"/>
+              </a:cxn>
+              <a:cxn ang="0">
+                <a:pos x="connsiteX42" y="connsiteY42"/>
+              </a:cxn>
+              <a:cxn ang="0">
+                <a:pos x="connsiteX43" y="connsiteY43"/>
+              </a:cxn>
+              <a:cxn ang="0">
+                <a:pos x="connsiteX44" y="connsiteY44"/>
+              </a:cxn>
+              <a:cxn ang="0">
+                <a:pos x="connsiteX45" y="connsiteY45"/>
+              </a:cxn>
+              <a:cxn ang="0">
+                <a:pos x="connsiteX46" y="connsiteY46"/>
+              </a:cxn>
+              <a:cxn ang="0">
+                <a:pos x="connsiteX47" y="connsiteY47"/>
+              </a:cxn>
+              <a:cxn ang="0">
+                <a:pos x="connsiteX48" y="connsiteY48"/>
+              </a:cxn>
+              <a:cxn ang="0">
+                <a:pos x="connsiteX49" y="connsiteY49"/>
+              </a:cxn>
+              <a:cxn ang="0">
+                <a:pos x="connsiteX50" y="connsiteY50"/>
+              </a:cxn>
+              <a:cxn ang="0">
+                <a:pos x="connsiteX51" y="connsiteY51"/>
+              </a:cxn>
+              <a:cxn ang="0">
+                <a:pos x="connsiteX52" y="connsiteY52"/>
+              </a:cxn>
+              <a:cxn ang="0">
+                <a:pos x="connsiteX53" y="connsiteY53"/>
+              </a:cxn>
+              <a:cxn ang="0">
+                <a:pos x="connsiteX54" y="connsiteY54"/>
+              </a:cxn>
+              <a:cxn ang="0">
+                <a:pos x="connsiteX55" y="connsiteY55"/>
+              </a:cxn>
+              <a:cxn ang="0">
+                <a:pos x="connsiteX56" y="connsiteY56"/>
+              </a:cxn>
+              <a:cxn ang="0">
+                <a:pos x="connsiteX57" y="connsiteY57"/>
+              </a:cxn>
+              <a:cxn ang="0">
+                <a:pos x="connsiteX58" y="connsiteY58"/>
+              </a:cxn>
+              <a:cxn ang="0">
+                <a:pos x="connsiteX59" y="connsiteY59"/>
+              </a:cxn>
+              <a:cxn ang="0">
+                <a:pos x="connsiteX60" y="connsiteY60"/>
+              </a:cxn>
+              <a:cxn ang="0">
+                <a:pos x="connsiteX61" y="connsiteY61"/>
+              </a:cxn>
+              <a:cxn ang="0">
+                <a:pos x="connsiteX62" y="connsiteY62"/>
+              </a:cxn>
+              <a:cxn ang="0">
+                <a:pos x="connsiteX63" y="connsiteY63"/>
+              </a:cxn>
+              <a:cxn ang="0">
+                <a:pos x="connsiteX64" y="connsiteY64"/>
+              </a:cxn>
+              <a:cxn ang="0">
+                <a:pos x="connsiteX65" y="connsiteY65"/>
+              </a:cxn>
+              <a:cxn ang="0">
+                <a:pos x="connsiteX66" y="connsiteY66"/>
+              </a:cxn>
+              <a:cxn ang="0">
+                <a:pos x="connsiteX67" y="connsiteY67"/>
+              </a:cxn>
+              <a:cxn ang="0">
+                <a:pos x="connsiteX68" y="connsiteY68"/>
+              </a:cxn>
+              <a:cxn ang="0">
+                <a:pos x="connsiteX69" y="connsiteY69"/>
+              </a:cxn>
+              <a:cxn ang="0">
+                <a:pos x="connsiteX70" y="connsiteY70"/>
+              </a:cxn>
+              <a:cxn ang="0">
+                <a:pos x="connsiteX71" y="connsiteY71"/>
+              </a:cxn>
+              <a:cxn ang="0">
+                <a:pos x="connsiteX72" y="connsiteY72"/>
+              </a:cxn>
+              <a:cxn ang="0">
+                <a:pos x="connsiteX73" y="connsiteY73"/>
+              </a:cxn>
+              <a:cxn ang="0">
+                <a:pos x="connsiteX74" y="connsiteY74"/>
+              </a:cxn>
+              <a:cxn ang="0">
+                <a:pos x="connsiteX75" y="connsiteY75"/>
+              </a:cxn>
+              <a:cxn ang="0">
+                <a:pos x="connsiteX76" y="connsiteY76"/>
+              </a:cxn>
+              <a:cxn ang="0">
+                <a:pos x="connsiteX77" y="connsiteY77"/>
+              </a:cxn>
+              <a:cxn ang="0">
+                <a:pos x="connsiteX78" y="connsiteY78"/>
+              </a:cxn>
+              <a:cxn ang="0">
+                <a:pos x="connsiteX79" y="connsiteY79"/>
+              </a:cxn>
+              <a:cxn ang="0">
+                <a:pos x="connsiteX80" y="connsiteY80"/>
+              </a:cxn>
+              <a:cxn ang="0">
+                <a:pos x="connsiteX81" y="connsiteY81"/>
+              </a:cxn>
+              <a:cxn ang="0">
+                <a:pos x="connsiteX82" y="connsiteY82"/>
+              </a:cxn>
+              <a:cxn ang="0">
+                <a:pos x="connsiteX83" y="connsiteY83"/>
+              </a:cxn>
+              <a:cxn ang="0">
+                <a:pos x="connsiteX84" y="connsiteY84"/>
+              </a:cxn>
+              <a:cxn ang="0">
+                <a:pos x="connsiteX85" y="connsiteY85"/>
+              </a:cxn>
+              <a:cxn ang="0">
+                <a:pos x="connsiteX86" y="connsiteY86"/>
+              </a:cxn>
+              <a:cxn ang="0">
+                <a:pos x="connsiteX87" y="connsiteY87"/>
+              </a:cxn>
+              <a:cxn ang="0">
+                <a:pos x="connsiteX88" y="connsiteY88"/>
+              </a:cxn>
+              <a:cxn ang="0">
+                <a:pos x="connsiteX89" y="connsiteY89"/>
+              </a:cxn>
+              <a:cxn ang="0">
+                <a:pos x="connsiteX90" y="connsiteY90"/>
+              </a:cxn>
+              <a:cxn ang="0">
+                <a:pos x="connsiteX91" y="connsiteY91"/>
+              </a:cxn>
+              <a:cxn ang="0">
+                <a:pos x="connsiteX92" y="connsiteY92"/>
+              </a:cxn>
+              <a:cxn ang="0">
+                <a:pos x="connsiteX93" y="connsiteY93"/>
+              </a:cxn>
+              <a:cxn ang="0">
+                <a:pos x="connsiteX94" y="connsiteY94"/>
+              </a:cxn>
+              <a:cxn ang="0">
+                <a:pos x="connsiteX95" y="connsiteY95"/>
+              </a:cxn>
+              <a:cxn ang="0">
+                <a:pos x="connsiteX96" y="connsiteY96"/>
+              </a:cxn>
+              <a:cxn ang="0">
+                <a:pos x="connsiteX97" y="connsiteY97"/>
+              </a:cxn>
+              <a:cxn ang="0">
+                <a:pos x="connsiteX98" y="connsiteY98"/>
+              </a:cxn>
+              <a:cxn ang="0">
+                <a:pos x="connsiteX99" y="connsiteY99"/>
+              </a:cxn>
+              <a:cxn ang="0">
+                <a:pos x="connsiteX100" y="connsiteY100"/>
+              </a:cxn>
+              <a:cxn ang="0">
+                <a:pos x="connsiteX101" y="connsiteY101"/>
+              </a:cxn>
+              <a:cxn ang="0">
+                <a:pos x="connsiteX102" y="connsiteY102"/>
+              </a:cxn>
+              <a:cxn ang="0">
+                <a:pos x="connsiteX103" y="connsiteY103"/>
+              </a:cxn>
+              <a:cxn ang="0">
+                <a:pos x="connsiteX104" y="connsiteY104"/>
+              </a:cxn>
+              <a:cxn ang="0">
+                <a:pos x="connsiteX105" y="connsiteY105"/>
+              </a:cxn>
+              <a:cxn ang="0">
+                <a:pos x="connsiteX106" y="connsiteY106"/>
+              </a:cxn>
+              <a:cxn ang="0">
+                <a:pos x="connsiteX107" y="connsiteY107"/>
+              </a:cxn>
+              <a:cxn ang="0">
+                <a:pos x="connsiteX108" y="connsiteY108"/>
+              </a:cxn>
+              <a:cxn ang="0">
+                <a:pos x="connsiteX109" y="connsiteY109"/>
+              </a:cxn>
+              <a:cxn ang="0">
+                <a:pos x="connsiteX110" y="connsiteY110"/>
+              </a:cxn>
+              <a:cxn ang="0">
+                <a:pos x="connsiteX111" y="connsiteY111"/>
+              </a:cxn>
+              <a:cxn ang="0">
+                <a:pos x="connsiteX112" y="connsiteY112"/>
+              </a:cxn>
+              <a:cxn ang="0">
+                <a:pos x="connsiteX113" y="connsiteY113"/>
+              </a:cxn>
+              <a:cxn ang="0">
+                <a:pos x="connsiteX114" y="connsiteY114"/>
+              </a:cxn>
+              <a:cxn ang="0">
+                <a:pos x="connsiteX115" y="connsiteY115"/>
+              </a:cxn>
+              <a:cxn ang="0">
+                <a:pos x="connsiteX116" y="connsiteY116"/>
+              </a:cxn>
+              <a:cxn ang="0">
+                <a:pos x="connsiteX117" y="connsiteY117"/>
+              </a:cxn>
+              <a:cxn ang="0">
+                <a:pos x="connsiteX118" y="connsiteY118"/>
+              </a:cxn>
+              <a:cxn ang="0">
+                <a:pos x="connsiteX119" y="connsiteY119"/>
+              </a:cxn>
+              <a:cxn ang="0">
+                <a:pos x="connsiteX120" y="connsiteY120"/>
+              </a:cxn>
+              <a:cxn ang="0">
+                <a:pos x="connsiteX121" y="connsiteY121"/>
+              </a:cxn>
+              <a:cxn ang="0">
+                <a:pos x="connsiteX122" y="connsiteY122"/>
+              </a:cxn>
+              <a:cxn ang="0">
+                <a:pos x="connsiteX123" y="connsiteY123"/>
+              </a:cxn>
+              <a:cxn ang="0">
+                <a:pos x="connsiteX124" y="connsiteY124"/>
+              </a:cxn>
+              <a:cxn ang="0">
+                <a:pos x="connsiteX125" y="connsiteY125"/>
+              </a:cxn>
+              <a:cxn ang="0">
+                <a:pos x="connsiteX126" y="connsiteY126"/>
+              </a:cxn>
+              <a:cxn ang="0">
+                <a:pos x="connsiteX127" y="connsiteY127"/>
+              </a:cxn>
+              <a:cxn ang="0">
+                <a:pos x="connsiteX128" y="connsiteY128"/>
+              </a:cxn>
+              <a:cxn ang="0">
+                <a:pos x="connsiteX129" y="connsiteY129"/>
+              </a:cxn>
+              <a:cxn ang="0">
+                <a:pos x="connsiteX130" y="connsiteY130"/>
+              </a:cxn>
+              <a:cxn ang="0">
+                <a:pos x="connsiteX131" y="connsiteY131"/>
+              </a:cxn>
+              <a:cxn ang="0">
+                <a:pos x="connsiteX132" y="connsiteY132"/>
+              </a:cxn>
+              <a:cxn ang="0">
+                <a:pos x="connsiteX133" y="connsiteY133"/>
+              </a:cxn>
+              <a:cxn ang="0">
+                <a:pos x="connsiteX134" y="connsiteY134"/>
+              </a:cxn>
+              <a:cxn ang="0">
+                <a:pos x="connsiteX135" y="connsiteY135"/>
+              </a:cxn>
+              <a:cxn ang="0">
+                <a:pos x="connsiteX136" y="connsiteY136"/>
+              </a:cxn>
+              <a:cxn ang="0">
+                <a:pos x="connsiteX137" y="connsiteY137"/>
+              </a:cxn>
+              <a:cxn ang="0">
+                <a:pos x="connsiteX138" y="connsiteY138"/>
+              </a:cxn>
+              <a:cxn ang="0">
+                <a:pos x="connsiteX139" y="connsiteY139"/>
+              </a:cxn>
+              <a:cxn ang="0">
+                <a:pos x="connsiteX140" y="connsiteY140"/>
+              </a:cxn>
+              <a:cxn ang="0">
+                <a:pos x="connsiteX141" y="connsiteY141"/>
+              </a:cxn>
+              <a:cxn ang="0">
+                <a:pos x="connsiteX142" y="connsiteY142"/>
+              </a:cxn>
+              <a:cxn ang="0">
+                <a:pos x="connsiteX143" y="connsiteY143"/>
+              </a:cxn>
+              <a:cxn ang="0">
+                <a:pos x="connsiteX144" y="connsiteY144"/>
+              </a:cxn>
+              <a:cxn ang="0">
+                <a:pos x="connsiteX145" y="connsiteY145"/>
+              </a:cxn>
+              <a:cxn ang="0">
+                <a:pos x="connsiteX146" y="connsiteY146"/>
+              </a:cxn>
+              <a:cxn ang="0">
+                <a:pos x="connsiteX147" y="connsiteY147"/>
+              </a:cxn>
+              <a:cxn ang="0">
+                <a:pos x="connsiteX148" y="connsiteY148"/>
+              </a:cxn>
+              <a:cxn ang="0">
+                <a:pos x="connsiteX149" y="connsiteY149"/>
+              </a:cxn>
+              <a:cxn ang="0">
+                <a:pos x="connsiteX150" y="connsiteY150"/>
+              </a:cxn>
+              <a:cxn ang="0">
+                <a:pos x="connsiteX151" y="connsiteY151"/>
+              </a:cxn>
+              <a:cxn ang="0">
+                <a:pos x="connsiteX152" y="connsiteY152"/>
+              </a:cxn>
+              <a:cxn ang="0">
+                <a:pos x="connsiteX153" y="connsiteY153"/>
+              </a:cxn>
+              <a:cxn ang="0">
+                <a:pos x="connsiteX154" y="connsiteY154"/>
+              </a:cxn>
+              <a:cxn ang="0">
+                <a:pos x="connsiteX155" y="connsiteY155"/>
+              </a:cxn>
+              <a:cxn ang="0">
+                <a:pos x="connsiteX156" y="connsiteY156"/>
+              </a:cxn>
+              <a:cxn ang="0">
+                <a:pos x="connsiteX157" y="connsiteY157"/>
+              </a:cxn>
+              <a:cxn ang="0">
+                <a:pos x="connsiteX158" y="connsiteY158"/>
+              </a:cxn>
+              <a:cxn ang="0">
+                <a:pos x="connsiteX159" y="connsiteY159"/>
+              </a:cxn>
+              <a:cxn ang="0">
+                <a:pos x="connsiteX160" y="connsiteY160"/>
+              </a:cxn>
+              <a:cxn ang="0">
+                <a:pos x="connsiteX161" y="connsiteY161"/>
+              </a:cxn>
+              <a:cxn ang="0">
+                <a:pos x="connsiteX162" y="connsiteY162"/>
+              </a:cxn>
+              <a:cxn ang="0">
+                <a:pos x="connsiteX163" y="connsiteY163"/>
+              </a:cxn>
+              <a:cxn ang="0">
+                <a:pos x="connsiteX164" y="connsiteY164"/>
+              </a:cxn>
+              <a:cxn ang="0">
+                <a:pos x="connsiteX165" y="connsiteY165"/>
+              </a:cxn>
+              <a:cxn ang="0">
+                <a:pos x="connsiteX166" y="connsiteY166"/>
+              </a:cxn>
+              <a:cxn ang="0">
+                <a:pos x="connsiteX167" y="connsiteY167"/>
+              </a:cxn>
+              <a:cxn ang="0">
+                <a:pos x="connsiteX168" y="connsiteY168"/>
+              </a:cxn>
+              <a:cxn ang="0">
+                <a:pos x="connsiteX169" y="connsiteY169"/>
+              </a:cxn>
+              <a:cxn ang="0">
+                <a:pos x="connsiteX170" y="connsiteY170"/>
+              </a:cxn>
+              <a:cxn ang="0">
+                <a:pos x="connsiteX171" y="connsiteY171"/>
+              </a:cxn>
+              <a:cxn ang="0">
+                <a:pos x="connsiteX172" y="connsiteY172"/>
+              </a:cxn>
+              <a:cxn ang="0">
+                <a:pos x="connsiteX173" y="connsiteY173"/>
+              </a:cxn>
+              <a:cxn ang="0">
+                <a:pos x="connsiteX174" y="connsiteY174"/>
+              </a:cxn>
+              <a:cxn ang="0">
+                <a:pos x="connsiteX175" y="connsiteY175"/>
+              </a:cxn>
+              <a:cxn ang="0">
+                <a:pos x="connsiteX176" y="connsiteY176"/>
+              </a:cxn>
+              <a:cxn ang="0">
+                <a:pos x="connsiteX177" y="connsiteY177"/>
+              </a:cxn>
+              <a:cxn ang="0">
+                <a:pos x="connsiteX178" y="connsiteY178"/>
+              </a:cxn>
+              <a:cxn ang="0">
+                <a:pos x="connsiteX179" y="connsiteY179"/>
+              </a:cxn>
+              <a:cxn ang="0">
+                <a:pos x="connsiteX180" y="connsiteY180"/>
+              </a:cxn>
+              <a:cxn ang="0">
+                <a:pos x="connsiteX181" y="connsiteY181"/>
+              </a:cxn>
+              <a:cxn ang="0">
+                <a:pos x="connsiteX182" y="connsiteY182"/>
+              </a:cxn>
+              <a:cxn ang="0">
+                <a:pos x="connsiteX183" y="connsiteY183"/>
+              </a:cxn>
+              <a:cxn ang="0">
+                <a:pos x="connsiteX184" y="connsiteY184"/>
+              </a:cxn>
+              <a:cxn ang="0">
+                <a:pos x="connsiteX185" y="connsiteY185"/>
+              </a:cxn>
+              <a:cxn ang="0">
+                <a:pos x="connsiteX186" y="connsiteY186"/>
+              </a:cxn>
+              <a:cxn ang="0">
+                <a:pos x="connsiteX187" y="connsiteY187"/>
+              </a:cxn>
+              <a:cxn ang="0">
+                <a:pos x="connsiteX188" y="connsiteY188"/>
+              </a:cxn>
+              <a:cxn ang="0">
+                <a:pos x="connsiteX189" y="connsiteY189"/>
+              </a:cxn>
+              <a:cxn ang="0">
+                <a:pos x="connsiteX190" y="connsiteY190"/>
+              </a:cxn>
+              <a:cxn ang="0">
+                <a:pos x="connsiteX191" y="connsiteY191"/>
+              </a:cxn>
+              <a:cxn ang="0">
+                <a:pos x="connsiteX192" y="connsiteY192"/>
+              </a:cxn>
+              <a:cxn ang="0">
+                <a:pos x="connsiteX193" y="connsiteY193"/>
+              </a:cxn>
+              <a:cxn ang="0">
+                <a:pos x="connsiteX194" y="connsiteY194"/>
+              </a:cxn>
+              <a:cxn ang="0">
+                <a:pos x="connsiteX195" y="connsiteY195"/>
+              </a:cxn>
+              <a:cxn ang="0">
+                <a:pos x="connsiteX196" y="connsiteY196"/>
+              </a:cxn>
+              <a:cxn ang="0">
+                <a:pos x="connsiteX197" y="connsiteY197"/>
+              </a:cxn>
+              <a:cxn ang="0">
+                <a:pos x="connsiteX198" y="connsiteY198"/>
+              </a:cxn>
+              <a:cxn ang="0">
+                <a:pos x="connsiteX199" y="connsiteY199"/>
+              </a:cxn>
+              <a:cxn ang="0">
+                <a:pos x="connsiteX200" y="connsiteY200"/>
+              </a:cxn>
+              <a:cxn ang="0">
+                <a:pos x="connsiteX201" y="connsiteY201"/>
+              </a:cxn>
+              <a:cxn ang="0">
+                <a:pos x="connsiteX202" y="connsiteY202"/>
+              </a:cxn>
+              <a:cxn ang="0">
+                <a:pos x="connsiteX203" y="connsiteY203"/>
+              </a:cxn>
+              <a:cxn ang="0">
+                <a:pos x="connsiteX204" y="connsiteY204"/>
+              </a:cxn>
+              <a:cxn ang="0">
+                <a:pos x="connsiteX205" y="connsiteY205"/>
+              </a:cxn>
+              <a:cxn ang="0">
+                <a:pos x="connsiteX206" y="connsiteY206"/>
+              </a:cxn>
+              <a:cxn ang="0">
+                <a:pos x="connsiteX207" y="connsiteY207"/>
+              </a:cxn>
+              <a:cxn ang="0">
+                <a:pos x="connsiteX208" y="connsiteY208"/>
+              </a:cxn>
+              <a:cxn ang="0">
+                <a:pos x="connsiteX209" y="connsiteY209"/>
+              </a:cxn>
+              <a:cxn ang="0">
+                <a:pos x="connsiteX210" y="connsiteY210"/>
+              </a:cxn>
+            </a:cxnLst>
+            <a:rect l="l" t="t" r="r" b="b"/>
+            <a:pathLst>
+              <a:path w="8070112" h="2573670">
+                <a:moveTo>
+                  <a:pt x="148856" y="818707"/>
+                </a:moveTo>
+                <a:cubicBezTo>
+                  <a:pt x="170121" y="808075"/>
+                  <a:pt x="237260" y="813305"/>
+                  <a:pt x="265814" y="797442"/>
+                </a:cubicBezTo>
+                <a:cubicBezTo>
+                  <a:pt x="288155" y="785030"/>
+                  <a:pt x="305364" y="762994"/>
+                  <a:pt x="329610" y="754912"/>
+                </a:cubicBezTo>
+                <a:cubicBezTo>
+                  <a:pt x="340242" y="751368"/>
+                  <a:pt x="351710" y="749722"/>
+                  <a:pt x="361507" y="744279"/>
+                </a:cubicBezTo>
+                <a:cubicBezTo>
+                  <a:pt x="383848" y="731867"/>
+                  <a:pt x="400508" y="707948"/>
+                  <a:pt x="425303" y="701749"/>
+                </a:cubicBezTo>
+                <a:lnTo>
+                  <a:pt x="510363" y="680484"/>
+                </a:lnTo>
+                <a:cubicBezTo>
+                  <a:pt x="524540" y="676940"/>
+                  <a:pt x="539030" y="674472"/>
+                  <a:pt x="552893" y="669851"/>
+                </a:cubicBezTo>
+                <a:cubicBezTo>
+                  <a:pt x="601936" y="653504"/>
+                  <a:pt x="573801" y="661417"/>
+                  <a:pt x="637954" y="648586"/>
+                </a:cubicBezTo>
+                <a:cubicBezTo>
+                  <a:pt x="712382" y="652130"/>
+                  <a:pt x="787181" y="650990"/>
+                  <a:pt x="861238" y="659219"/>
+                </a:cubicBezTo>
+                <a:cubicBezTo>
+                  <a:pt x="883516" y="661694"/>
+                  <a:pt x="903768" y="673396"/>
+                  <a:pt x="925033" y="680484"/>
+                </a:cubicBezTo>
+                <a:lnTo>
+                  <a:pt x="1052624" y="723014"/>
+                </a:lnTo>
+                <a:cubicBezTo>
+                  <a:pt x="1079964" y="732127"/>
+                  <a:pt x="1097666" y="738936"/>
+                  <a:pt x="1127052" y="744279"/>
+                </a:cubicBezTo>
+                <a:cubicBezTo>
+                  <a:pt x="1151709" y="748762"/>
+                  <a:pt x="1176725" y="751003"/>
+                  <a:pt x="1201480" y="754912"/>
+                </a:cubicBezTo>
+                <a:lnTo>
+                  <a:pt x="1329070" y="776177"/>
+                </a:lnTo>
+                <a:cubicBezTo>
+                  <a:pt x="1350335" y="779721"/>
+                  <a:pt x="1371951" y="781580"/>
+                  <a:pt x="1392866" y="786809"/>
+                </a:cubicBezTo>
+                <a:cubicBezTo>
+                  <a:pt x="1407043" y="790353"/>
+                  <a:pt x="1421345" y="793427"/>
+                  <a:pt x="1435396" y="797442"/>
+                </a:cubicBezTo>
+                <a:cubicBezTo>
+                  <a:pt x="1446172" y="800521"/>
+                  <a:pt x="1456420" y="805357"/>
+                  <a:pt x="1467293" y="808075"/>
+                </a:cubicBezTo>
+                <a:cubicBezTo>
+                  <a:pt x="1484825" y="812458"/>
+                  <a:pt x="1502735" y="815163"/>
+                  <a:pt x="1520456" y="818707"/>
+                </a:cubicBezTo>
+                <a:cubicBezTo>
+                  <a:pt x="1557684" y="817275"/>
+                  <a:pt x="1766901" y="820892"/>
+                  <a:pt x="1860698" y="797442"/>
+                </a:cubicBezTo>
+                <a:cubicBezTo>
+                  <a:pt x="1975469" y="768749"/>
+                  <a:pt x="1879031" y="787910"/>
+                  <a:pt x="1967024" y="754912"/>
+                </a:cubicBezTo>
+                <a:cubicBezTo>
+                  <a:pt x="1980707" y="749781"/>
+                  <a:pt x="1995557" y="748478"/>
+                  <a:pt x="2009554" y="744279"/>
+                </a:cubicBezTo>
+                <a:cubicBezTo>
+                  <a:pt x="2041759" y="734617"/>
+                  <a:pt x="2073349" y="723014"/>
+                  <a:pt x="2105247" y="712382"/>
+                </a:cubicBezTo>
+                <a:lnTo>
+                  <a:pt x="2200940" y="680484"/>
+                </a:lnTo>
+                <a:cubicBezTo>
+                  <a:pt x="2211573" y="676940"/>
+                  <a:pt x="2221848" y="672049"/>
+                  <a:pt x="2232838" y="669851"/>
+                </a:cubicBezTo>
+                <a:cubicBezTo>
+                  <a:pt x="2250559" y="666307"/>
+                  <a:pt x="2268110" y="661775"/>
+                  <a:pt x="2286000" y="659219"/>
+                </a:cubicBezTo>
+                <a:cubicBezTo>
+                  <a:pt x="2350468" y="650009"/>
+                  <a:pt x="2447637" y="643091"/>
+                  <a:pt x="2509284" y="637954"/>
+                </a:cubicBezTo>
+                <a:cubicBezTo>
+                  <a:pt x="2530549" y="634410"/>
+                  <a:pt x="2551738" y="630370"/>
+                  <a:pt x="2573080" y="627321"/>
+                </a:cubicBezTo>
+                <a:cubicBezTo>
+                  <a:pt x="2601367" y="623280"/>
+                  <a:pt x="2629955" y="621386"/>
+                  <a:pt x="2658140" y="616688"/>
+                </a:cubicBezTo>
+                <a:cubicBezTo>
+                  <a:pt x="2717821" y="606741"/>
+                  <a:pt x="2681992" y="608067"/>
+                  <a:pt x="2732568" y="595423"/>
+                </a:cubicBezTo>
+                <a:cubicBezTo>
+                  <a:pt x="2750100" y="591040"/>
+                  <a:pt x="2768199" y="589174"/>
+                  <a:pt x="2785731" y="584791"/>
+                </a:cubicBezTo>
+                <a:cubicBezTo>
+                  <a:pt x="2839178" y="571429"/>
+                  <a:pt x="2797554" y="578878"/>
+                  <a:pt x="2849526" y="552893"/>
+                </a:cubicBezTo>
+                <a:cubicBezTo>
+                  <a:pt x="2879216" y="538048"/>
+                  <a:pt x="2928429" y="535546"/>
+                  <a:pt x="2955852" y="531628"/>
+                </a:cubicBezTo>
+                <a:cubicBezTo>
+                  <a:pt x="3011994" y="512913"/>
+                  <a:pt x="2978425" y="527211"/>
+                  <a:pt x="3051545" y="478465"/>
+                </a:cubicBezTo>
+                <a:lnTo>
+                  <a:pt x="3083442" y="457200"/>
+                </a:lnTo>
+                <a:cubicBezTo>
+                  <a:pt x="3090530" y="446567"/>
+                  <a:pt x="3094728" y="433285"/>
+                  <a:pt x="3104707" y="425302"/>
+                </a:cubicBezTo>
+                <a:cubicBezTo>
+                  <a:pt x="3113459" y="418301"/>
+                  <a:pt x="3128680" y="422595"/>
+                  <a:pt x="3136605" y="414670"/>
+                </a:cubicBezTo>
+                <a:cubicBezTo>
+                  <a:pt x="3144530" y="406745"/>
+                  <a:pt x="3140237" y="391524"/>
+                  <a:pt x="3147238" y="382772"/>
+                </a:cubicBezTo>
+                <a:cubicBezTo>
+                  <a:pt x="3162229" y="364033"/>
+                  <a:pt x="3190019" y="357879"/>
+                  <a:pt x="3211033" y="350875"/>
+                </a:cubicBezTo>
+                <a:cubicBezTo>
+                  <a:pt x="3236223" y="325684"/>
+                  <a:pt x="3260024" y="299101"/>
+                  <a:pt x="3296093" y="287079"/>
+                </a:cubicBezTo>
+                <a:lnTo>
+                  <a:pt x="3327991" y="276447"/>
+                </a:lnTo>
+                <a:cubicBezTo>
+                  <a:pt x="3338624" y="269359"/>
+                  <a:pt x="3348459" y="260897"/>
+                  <a:pt x="3359889" y="255182"/>
+                </a:cubicBezTo>
+                <a:cubicBezTo>
+                  <a:pt x="3369913" y="250170"/>
+                  <a:pt x="3382176" y="250315"/>
+                  <a:pt x="3391786" y="244549"/>
+                </a:cubicBezTo>
+                <a:cubicBezTo>
+                  <a:pt x="3400382" y="239391"/>
+                  <a:pt x="3404086" y="227767"/>
+                  <a:pt x="3413052" y="223284"/>
+                </a:cubicBezTo>
+                <a:cubicBezTo>
+                  <a:pt x="3433101" y="213260"/>
+                  <a:pt x="3454867" y="206415"/>
+                  <a:pt x="3476847" y="202019"/>
+                </a:cubicBezTo>
+                <a:cubicBezTo>
+                  <a:pt x="3558029" y="185782"/>
+                  <a:pt x="3512078" y="193627"/>
+                  <a:pt x="3615070" y="180754"/>
+                </a:cubicBezTo>
+                <a:cubicBezTo>
+                  <a:pt x="3628698" y="177347"/>
+                  <a:pt x="3674244" y="167115"/>
+                  <a:pt x="3689498" y="159488"/>
+                </a:cubicBezTo>
+                <a:cubicBezTo>
+                  <a:pt x="3700928" y="153773"/>
+                  <a:pt x="3708999" y="141322"/>
+                  <a:pt x="3721396" y="138223"/>
+                </a:cubicBezTo>
+                <a:cubicBezTo>
+                  <a:pt x="3752532" y="130439"/>
+                  <a:pt x="3785191" y="131135"/>
+                  <a:pt x="3817089" y="127591"/>
+                </a:cubicBezTo>
+                <a:cubicBezTo>
+                  <a:pt x="3827721" y="124047"/>
+                  <a:pt x="3838113" y="119676"/>
+                  <a:pt x="3848986" y="116958"/>
+                </a:cubicBezTo>
+                <a:cubicBezTo>
+                  <a:pt x="3916459" y="100090"/>
+                  <a:pt x="3907821" y="111526"/>
+                  <a:pt x="3987210" y="85061"/>
+                </a:cubicBezTo>
+                <a:cubicBezTo>
+                  <a:pt x="3997842" y="81517"/>
+                  <a:pt x="4007976" y="75738"/>
+                  <a:pt x="4019107" y="74428"/>
+                </a:cubicBezTo>
+                <a:cubicBezTo>
+                  <a:pt x="4068511" y="68615"/>
+                  <a:pt x="4118390" y="67926"/>
+                  <a:pt x="4167963" y="63795"/>
+                </a:cubicBezTo>
+                <a:cubicBezTo>
+                  <a:pt x="4203459" y="60837"/>
+                  <a:pt x="4238847" y="56707"/>
+                  <a:pt x="4274289" y="53163"/>
+                </a:cubicBezTo>
+                <a:cubicBezTo>
+                  <a:pt x="4302642" y="46075"/>
+                  <a:pt x="4330691" y="37630"/>
+                  <a:pt x="4359349" y="31898"/>
+                </a:cubicBezTo>
+                <a:cubicBezTo>
+                  <a:pt x="4377070" y="28354"/>
+                  <a:pt x="4395077" y="26020"/>
+                  <a:pt x="4412512" y="21265"/>
+                </a:cubicBezTo>
+                <a:cubicBezTo>
+                  <a:pt x="4434137" y="15367"/>
+                  <a:pt x="4476307" y="0"/>
+                  <a:pt x="4476307" y="0"/>
+                </a:cubicBezTo>
+                <a:lnTo>
+                  <a:pt x="5061098" y="10633"/>
+                </a:lnTo>
+                <a:cubicBezTo>
+                  <a:pt x="5072299" y="11019"/>
+                  <a:pt x="5082971" y="16253"/>
+                  <a:pt x="5092996" y="21265"/>
+                </a:cubicBezTo>
+                <a:cubicBezTo>
+                  <a:pt x="5104426" y="26980"/>
+                  <a:pt x="5113464" y="36815"/>
+                  <a:pt x="5124893" y="42530"/>
+                </a:cubicBezTo>
+                <a:cubicBezTo>
+                  <a:pt x="5212939" y="86554"/>
+                  <a:pt x="5097269" y="13483"/>
+                  <a:pt x="5188689" y="74428"/>
+                </a:cubicBezTo>
+                <a:cubicBezTo>
+                  <a:pt x="5264678" y="188413"/>
+                  <a:pt x="5146340" y="15422"/>
+                  <a:pt x="5241852" y="138223"/>
+                </a:cubicBezTo>
+                <a:cubicBezTo>
+                  <a:pt x="5257543" y="158397"/>
+                  <a:pt x="5270205" y="180754"/>
+                  <a:pt x="5284382" y="202019"/>
+                </a:cubicBezTo>
+                <a:cubicBezTo>
+                  <a:pt x="5291470" y="212651"/>
+                  <a:pt x="5296611" y="224880"/>
+                  <a:pt x="5305647" y="233916"/>
+                </a:cubicBezTo>
+                <a:cubicBezTo>
+                  <a:pt x="5344983" y="273254"/>
+                  <a:pt x="5321352" y="246842"/>
+                  <a:pt x="5369442" y="318977"/>
+                </a:cubicBezTo>
+                <a:cubicBezTo>
+                  <a:pt x="5376530" y="329610"/>
+                  <a:pt x="5386666" y="338752"/>
+                  <a:pt x="5390707" y="350875"/>
+                </a:cubicBezTo>
+                <a:cubicBezTo>
+                  <a:pt x="5394251" y="361507"/>
+                  <a:pt x="5396702" y="372569"/>
+                  <a:pt x="5401340" y="382772"/>
+                </a:cubicBezTo>
+                <a:cubicBezTo>
+                  <a:pt x="5414458" y="411631"/>
+                  <a:pt x="5433845" y="437759"/>
+                  <a:pt x="5443870" y="467833"/>
+                </a:cubicBezTo>
+                <a:cubicBezTo>
+                  <a:pt x="5494394" y="619406"/>
+                  <a:pt x="5443636" y="461695"/>
+                  <a:pt x="5475768" y="574158"/>
+                </a:cubicBezTo>
+                <a:cubicBezTo>
+                  <a:pt x="5478847" y="584935"/>
+                  <a:pt x="5483682" y="595183"/>
+                  <a:pt x="5486400" y="606056"/>
+                </a:cubicBezTo>
+                <a:cubicBezTo>
+                  <a:pt x="5490783" y="623588"/>
+                  <a:pt x="5492278" y="641784"/>
+                  <a:pt x="5497033" y="659219"/>
+                </a:cubicBezTo>
+                <a:cubicBezTo>
+                  <a:pt x="5502931" y="680844"/>
+                  <a:pt x="5511210" y="701749"/>
+                  <a:pt x="5518298" y="723014"/>
+                </a:cubicBezTo>
+                <a:lnTo>
+                  <a:pt x="5539563" y="786809"/>
+                </a:lnTo>
+                <a:cubicBezTo>
+                  <a:pt x="5565062" y="863307"/>
+                  <a:pt x="5534120" y="767759"/>
+                  <a:pt x="5560828" y="861237"/>
+                </a:cubicBezTo>
+                <a:cubicBezTo>
+                  <a:pt x="5563907" y="872014"/>
+                  <a:pt x="5566018" y="883338"/>
+                  <a:pt x="5571461" y="893135"/>
+                </a:cubicBezTo>
+                <a:cubicBezTo>
+                  <a:pt x="5583873" y="915476"/>
+                  <a:pt x="5599814" y="935665"/>
+                  <a:pt x="5613991" y="956930"/>
+                </a:cubicBezTo>
+                <a:lnTo>
+                  <a:pt x="5635256" y="988828"/>
+                </a:lnTo>
+                <a:cubicBezTo>
+                  <a:pt x="5642344" y="999461"/>
+                  <a:pt x="5652480" y="1008603"/>
+                  <a:pt x="5656521" y="1020726"/>
+                </a:cubicBezTo>
+                <a:cubicBezTo>
+                  <a:pt x="5681827" y="1096644"/>
+                  <a:pt x="5665352" y="1065871"/>
+                  <a:pt x="5699052" y="1116419"/>
+                </a:cubicBezTo>
+                <a:cubicBezTo>
+                  <a:pt x="5728926" y="1206043"/>
+                  <a:pt x="5697561" y="1103000"/>
+                  <a:pt x="5720317" y="1307805"/>
+                </a:cubicBezTo>
+                <a:cubicBezTo>
+                  <a:pt x="5721555" y="1318944"/>
+                  <a:pt x="5727870" y="1328926"/>
+                  <a:pt x="5730949" y="1339702"/>
+                </a:cubicBezTo>
+                <a:cubicBezTo>
+                  <a:pt x="5738378" y="1365704"/>
+                  <a:pt x="5750214" y="1427079"/>
+                  <a:pt x="5762847" y="1446028"/>
+                </a:cubicBezTo>
+                <a:cubicBezTo>
+                  <a:pt x="5769935" y="1456661"/>
+                  <a:pt x="5778397" y="1466496"/>
+                  <a:pt x="5784112" y="1477926"/>
+                </a:cubicBezTo>
+                <a:cubicBezTo>
+                  <a:pt x="5789124" y="1487950"/>
+                  <a:pt x="5787744" y="1501071"/>
+                  <a:pt x="5794745" y="1509823"/>
+                </a:cubicBezTo>
+                <a:cubicBezTo>
+                  <a:pt x="5802728" y="1519801"/>
+                  <a:pt x="5816664" y="1523105"/>
+                  <a:pt x="5826642" y="1531088"/>
+                </a:cubicBezTo>
+                <a:cubicBezTo>
+                  <a:pt x="5834470" y="1537350"/>
+                  <a:pt x="5840819" y="1545265"/>
+                  <a:pt x="5847907" y="1552354"/>
+                </a:cubicBezTo>
+                <a:cubicBezTo>
+                  <a:pt x="5851451" y="1562986"/>
+                  <a:pt x="5849420" y="1577737"/>
+                  <a:pt x="5858540" y="1584251"/>
+                </a:cubicBezTo>
+                <a:cubicBezTo>
+                  <a:pt x="5876780" y="1597279"/>
+                  <a:pt x="5901070" y="1598428"/>
+                  <a:pt x="5922335" y="1605516"/>
+                </a:cubicBezTo>
+                <a:lnTo>
+                  <a:pt x="5954233" y="1616149"/>
+                </a:lnTo>
+                <a:lnTo>
+                  <a:pt x="6049926" y="1648047"/>
+                </a:lnTo>
+                <a:cubicBezTo>
+                  <a:pt x="6060559" y="1651591"/>
+                  <a:pt x="6070625" y="1658231"/>
+                  <a:pt x="6081824" y="1658679"/>
+                </a:cubicBezTo>
+                <a:lnTo>
+                  <a:pt x="6347638" y="1669312"/>
+                </a:lnTo>
+                <a:cubicBezTo>
+                  <a:pt x="6389663" y="1675315"/>
+                  <a:pt x="6433758" y="1680209"/>
+                  <a:pt x="6475228" y="1690577"/>
+                </a:cubicBezTo>
+                <a:cubicBezTo>
+                  <a:pt x="6486101" y="1693295"/>
+                  <a:pt x="6495940" y="1700510"/>
+                  <a:pt x="6507126" y="1701209"/>
+                </a:cubicBezTo>
+                <a:cubicBezTo>
+                  <a:pt x="6609768" y="1707624"/>
+                  <a:pt x="6712689" y="1708298"/>
+                  <a:pt x="6815470" y="1711842"/>
+                </a:cubicBezTo>
+                <a:cubicBezTo>
+                  <a:pt x="6877073" y="1716976"/>
+                  <a:pt x="6974319" y="1723902"/>
+                  <a:pt x="7038754" y="1733107"/>
+                </a:cubicBezTo>
+                <a:cubicBezTo>
+                  <a:pt x="7056644" y="1735663"/>
+                  <a:pt x="7073855" y="1743148"/>
+                  <a:pt x="7091917" y="1743740"/>
+                </a:cubicBezTo>
+                <a:cubicBezTo>
+                  <a:pt x="7290316" y="1750245"/>
+                  <a:pt x="7488866" y="1750828"/>
+                  <a:pt x="7687340" y="1754372"/>
+                </a:cubicBezTo>
+                <a:cubicBezTo>
+                  <a:pt x="7715693" y="1761460"/>
+                  <a:pt x="7744674" y="1766395"/>
+                  <a:pt x="7772400" y="1775637"/>
+                </a:cubicBezTo>
+                <a:cubicBezTo>
+                  <a:pt x="7783033" y="1779181"/>
+                  <a:pt x="7793425" y="1783552"/>
+                  <a:pt x="7804298" y="1786270"/>
+                </a:cubicBezTo>
+                <a:cubicBezTo>
+                  <a:pt x="7828568" y="1792337"/>
+                  <a:pt x="7865051" y="1795381"/>
+                  <a:pt x="7889359" y="1807535"/>
+                </a:cubicBezTo>
+                <a:cubicBezTo>
+                  <a:pt x="7900788" y="1813250"/>
+                  <a:pt x="7909827" y="1823085"/>
+                  <a:pt x="7921256" y="1828800"/>
+                </a:cubicBezTo>
+                <a:cubicBezTo>
+                  <a:pt x="8009302" y="1872824"/>
+                  <a:pt x="7893632" y="1799753"/>
+                  <a:pt x="7985052" y="1860698"/>
+                </a:cubicBezTo>
+                <a:cubicBezTo>
+                  <a:pt x="7992140" y="1871330"/>
+                  <a:pt x="7998334" y="1882617"/>
+                  <a:pt x="8006317" y="1892595"/>
+                </a:cubicBezTo>
+                <a:cubicBezTo>
+                  <a:pt x="8012579" y="1900423"/>
+                  <a:pt x="8023099" y="1904895"/>
+                  <a:pt x="8027582" y="1913861"/>
+                </a:cubicBezTo>
+                <a:cubicBezTo>
+                  <a:pt x="8044424" y="1947546"/>
+                  <a:pt x="8049306" y="1984577"/>
+                  <a:pt x="8059480" y="2020186"/>
+                </a:cubicBezTo>
+                <a:cubicBezTo>
+                  <a:pt x="8062559" y="2030963"/>
+                  <a:pt x="8066568" y="2041451"/>
+                  <a:pt x="8070112" y="2052084"/>
+                </a:cubicBezTo>
+                <a:cubicBezTo>
+                  <a:pt x="8066568" y="2140689"/>
+                  <a:pt x="8065798" y="2229448"/>
+                  <a:pt x="8059480" y="2317898"/>
+                </a:cubicBezTo>
+                <a:cubicBezTo>
+                  <a:pt x="8058681" y="2329077"/>
+                  <a:pt x="8054613" y="2340185"/>
+                  <a:pt x="8048847" y="2349795"/>
+                </a:cubicBezTo>
+                <a:cubicBezTo>
+                  <a:pt x="8038745" y="2366632"/>
+                  <a:pt x="8010175" y="2382666"/>
+                  <a:pt x="7995684" y="2392326"/>
+                </a:cubicBezTo>
+                <a:cubicBezTo>
+                  <a:pt x="7958308" y="2448389"/>
+                  <a:pt x="7995970" y="2407392"/>
+                  <a:pt x="7931889" y="2434856"/>
+                </a:cubicBezTo>
+                <a:cubicBezTo>
+                  <a:pt x="7920143" y="2439890"/>
+                  <a:pt x="7911668" y="2450931"/>
+                  <a:pt x="7899991" y="2456121"/>
+                </a:cubicBezTo>
+                <a:cubicBezTo>
+                  <a:pt x="7879508" y="2465225"/>
+                  <a:pt x="7857461" y="2470298"/>
+                  <a:pt x="7836196" y="2477386"/>
+                </a:cubicBezTo>
+                <a:cubicBezTo>
+                  <a:pt x="7763808" y="2501515"/>
+                  <a:pt x="7815475" y="2487088"/>
+                  <a:pt x="7676707" y="2498651"/>
+                </a:cubicBezTo>
+                <a:cubicBezTo>
+                  <a:pt x="7600235" y="2524143"/>
+                  <a:pt x="7695727" y="2493217"/>
+                  <a:pt x="7602280" y="2519916"/>
+                </a:cubicBezTo>
+                <a:cubicBezTo>
+                  <a:pt x="7591503" y="2522995"/>
+                  <a:pt x="7581528" y="2529376"/>
+                  <a:pt x="7570382" y="2530549"/>
+                </a:cubicBezTo>
+                <a:cubicBezTo>
+                  <a:pt x="7513877" y="2536497"/>
+                  <a:pt x="7456882" y="2536464"/>
+                  <a:pt x="7400261" y="2541182"/>
+                </a:cubicBezTo>
+                <a:cubicBezTo>
+                  <a:pt x="7371785" y="2543555"/>
+                  <a:pt x="7343617" y="2548823"/>
+                  <a:pt x="7315200" y="2551814"/>
+                </a:cubicBezTo>
+                <a:cubicBezTo>
+                  <a:pt x="7276268" y="2555912"/>
+                  <a:pt x="7237228" y="2558903"/>
+                  <a:pt x="7198242" y="2562447"/>
+                </a:cubicBezTo>
+                <a:cubicBezTo>
+                  <a:pt x="7184065" y="2565991"/>
+                  <a:pt x="7170325" y="2573079"/>
+                  <a:pt x="7155712" y="2573079"/>
+                </a:cubicBezTo>
+                <a:cubicBezTo>
+                  <a:pt x="6760312" y="2573079"/>
+                  <a:pt x="6832837" y="2579238"/>
+                  <a:pt x="6613452" y="2551814"/>
+                </a:cubicBezTo>
+                <a:cubicBezTo>
+                  <a:pt x="6602819" y="2548270"/>
+                  <a:pt x="6591351" y="2546625"/>
+                  <a:pt x="6581554" y="2541182"/>
+                </a:cubicBezTo>
+                <a:cubicBezTo>
+                  <a:pt x="6559213" y="2528770"/>
+                  <a:pt x="6542005" y="2506733"/>
+                  <a:pt x="6517759" y="2498651"/>
+                </a:cubicBezTo>
+                <a:cubicBezTo>
+                  <a:pt x="6496494" y="2491563"/>
+                  <a:pt x="6472614" y="2489820"/>
+                  <a:pt x="6453963" y="2477386"/>
+                </a:cubicBezTo>
+                <a:cubicBezTo>
+                  <a:pt x="6443331" y="2470298"/>
+                  <a:pt x="6433743" y="2461311"/>
+                  <a:pt x="6422066" y="2456121"/>
+                </a:cubicBezTo>
+                <a:cubicBezTo>
+                  <a:pt x="6376594" y="2435911"/>
+                  <a:pt x="6359033" y="2436592"/>
+                  <a:pt x="6315740" y="2424223"/>
+                </a:cubicBezTo>
+                <a:cubicBezTo>
+                  <a:pt x="6304963" y="2421144"/>
+                  <a:pt x="6294475" y="2417135"/>
+                  <a:pt x="6283842" y="2413591"/>
+                </a:cubicBezTo>
+                <a:cubicBezTo>
+                  <a:pt x="6262734" y="2399519"/>
+                  <a:pt x="6221484" y="2363937"/>
+                  <a:pt x="6188149" y="2360428"/>
+                </a:cubicBezTo>
+                <a:cubicBezTo>
+                  <a:pt x="6131644" y="2354480"/>
+                  <a:pt x="6074735" y="2353339"/>
+                  <a:pt x="6018028" y="2349795"/>
+                </a:cubicBezTo>
+                <a:cubicBezTo>
+                  <a:pt x="5857693" y="2317729"/>
+                  <a:pt x="6057474" y="2358561"/>
+                  <a:pt x="5922335" y="2328530"/>
+                </a:cubicBezTo>
+                <a:cubicBezTo>
+                  <a:pt x="5906619" y="2325038"/>
+                  <a:pt x="5856277" y="2317822"/>
+                  <a:pt x="5837275" y="2307265"/>
+                </a:cubicBezTo>
+                <a:cubicBezTo>
+                  <a:pt x="5801045" y="2287137"/>
+                  <a:pt x="5744075" y="2247208"/>
+                  <a:pt x="5720317" y="2211572"/>
+                </a:cubicBezTo>
+                <a:cubicBezTo>
+                  <a:pt x="5693491" y="2171334"/>
+                  <a:pt x="5708088" y="2188711"/>
+                  <a:pt x="5677786" y="2158409"/>
+                </a:cubicBezTo>
+                <a:cubicBezTo>
+                  <a:pt x="5674242" y="2147777"/>
+                  <a:pt x="5673371" y="2135837"/>
+                  <a:pt x="5667154" y="2126512"/>
+                </a:cubicBezTo>
+                <a:cubicBezTo>
+                  <a:pt x="5645506" y="2094040"/>
+                  <a:pt x="5631378" y="2095764"/>
+                  <a:pt x="5603359" y="2073349"/>
+                </a:cubicBezTo>
+                <a:cubicBezTo>
+                  <a:pt x="5550745" y="2031259"/>
+                  <a:pt x="5616095" y="2075454"/>
+                  <a:pt x="5560828" y="2020186"/>
+                </a:cubicBezTo>
+                <a:cubicBezTo>
+                  <a:pt x="5551792" y="2011150"/>
+                  <a:pt x="5539563" y="2006009"/>
+                  <a:pt x="5528931" y="1998921"/>
+                </a:cubicBezTo>
+                <a:cubicBezTo>
+                  <a:pt x="5467988" y="1907506"/>
+                  <a:pt x="5549136" y="2015085"/>
+                  <a:pt x="5475768" y="1956391"/>
+                </a:cubicBezTo>
+                <a:cubicBezTo>
+                  <a:pt x="5465789" y="1948408"/>
+                  <a:pt x="5462684" y="1934310"/>
+                  <a:pt x="5454503" y="1924493"/>
+                </a:cubicBezTo>
+                <a:cubicBezTo>
+                  <a:pt x="5444877" y="1912941"/>
+                  <a:pt x="5432391" y="1904012"/>
+                  <a:pt x="5422605" y="1892595"/>
+                </a:cubicBezTo>
+                <a:cubicBezTo>
+                  <a:pt x="5411072" y="1879140"/>
+                  <a:pt x="5402480" y="1863310"/>
+                  <a:pt x="5390707" y="1850065"/>
+                </a:cubicBezTo>
+                <a:cubicBezTo>
+                  <a:pt x="5374057" y="1831334"/>
+                  <a:pt x="5351447" y="1817754"/>
+                  <a:pt x="5337545" y="1796902"/>
+                </a:cubicBezTo>
+                <a:cubicBezTo>
+                  <a:pt x="5330457" y="1786270"/>
+                  <a:pt x="5321995" y="1776434"/>
+                  <a:pt x="5316280" y="1765005"/>
+                </a:cubicBezTo>
+                <a:cubicBezTo>
+                  <a:pt x="5296890" y="1726226"/>
+                  <a:pt x="5313402" y="1702835"/>
+                  <a:pt x="5263117" y="1669312"/>
+                </a:cubicBezTo>
+                <a:cubicBezTo>
+                  <a:pt x="5228169" y="1646014"/>
+                  <a:pt x="5237838" y="1648419"/>
+                  <a:pt x="5199321" y="1637414"/>
+                </a:cubicBezTo>
+                <a:cubicBezTo>
+                  <a:pt x="5173313" y="1629983"/>
+                  <a:pt x="5111953" y="1618154"/>
+                  <a:pt x="5092996" y="1605516"/>
+                </a:cubicBezTo>
+                <a:cubicBezTo>
+                  <a:pt x="5051773" y="1578034"/>
+                  <a:pt x="5073221" y="1588292"/>
+                  <a:pt x="5029200" y="1573619"/>
+                </a:cubicBezTo>
+                <a:cubicBezTo>
+                  <a:pt x="4937794" y="1512681"/>
+                  <a:pt x="5053441" y="1585739"/>
+                  <a:pt x="4965405" y="1541721"/>
+                </a:cubicBezTo>
+                <a:cubicBezTo>
+                  <a:pt x="4882956" y="1500496"/>
+                  <a:pt x="4981787" y="1536550"/>
+                  <a:pt x="4901610" y="1509823"/>
+                </a:cubicBezTo>
+                <a:cubicBezTo>
+                  <a:pt x="4894522" y="1499191"/>
+                  <a:pt x="4889381" y="1486962"/>
+                  <a:pt x="4880345" y="1477926"/>
+                </a:cubicBezTo>
+                <a:cubicBezTo>
+                  <a:pt x="4859734" y="1457315"/>
+                  <a:pt x="4842492" y="1454676"/>
+                  <a:pt x="4816549" y="1446028"/>
+                </a:cubicBezTo>
+                <a:cubicBezTo>
+                  <a:pt x="4809461" y="1435395"/>
+                  <a:pt x="4804320" y="1423166"/>
+                  <a:pt x="4795284" y="1414130"/>
+                </a:cubicBezTo>
+                <a:cubicBezTo>
+                  <a:pt x="4774673" y="1393519"/>
+                  <a:pt x="4757432" y="1390880"/>
+                  <a:pt x="4731489" y="1382233"/>
+                </a:cubicBezTo>
+                <a:cubicBezTo>
+                  <a:pt x="4710224" y="1368056"/>
+                  <a:pt x="4691939" y="1347784"/>
+                  <a:pt x="4667693" y="1339702"/>
+                </a:cubicBezTo>
+                <a:lnTo>
+                  <a:pt x="4540103" y="1297172"/>
+                </a:lnTo>
+                <a:lnTo>
+                  <a:pt x="4508205" y="1286540"/>
+                </a:lnTo>
+                <a:cubicBezTo>
+                  <a:pt x="4497572" y="1282996"/>
+                  <a:pt x="4487402" y="1277492"/>
+                  <a:pt x="4476307" y="1275907"/>
+                </a:cubicBezTo>
+                <a:lnTo>
+                  <a:pt x="4401880" y="1265275"/>
+                </a:lnTo>
+                <a:lnTo>
+                  <a:pt x="3891517" y="1275907"/>
+                </a:lnTo>
+                <a:cubicBezTo>
+                  <a:pt x="3862518" y="1277044"/>
+                  <a:pt x="3851817" y="1295757"/>
+                  <a:pt x="3827721" y="1307805"/>
+                </a:cubicBezTo>
+                <a:cubicBezTo>
+                  <a:pt x="3797303" y="1323014"/>
+                  <a:pt x="3764692" y="1320904"/>
+                  <a:pt x="3732028" y="1329070"/>
+                </a:cubicBezTo>
+                <a:cubicBezTo>
+                  <a:pt x="3710282" y="1334507"/>
+                  <a:pt x="3668233" y="1350335"/>
+                  <a:pt x="3668233" y="1350335"/>
+                </a:cubicBezTo>
+                <a:cubicBezTo>
+                  <a:pt x="3661145" y="1360968"/>
+                  <a:pt x="3658764" y="1377318"/>
+                  <a:pt x="3646968" y="1382233"/>
+                </a:cubicBezTo>
+                <a:cubicBezTo>
+                  <a:pt x="3613604" y="1396135"/>
+                  <a:pt x="3540642" y="1403498"/>
+                  <a:pt x="3540642" y="1403498"/>
+                </a:cubicBezTo>
+                <a:cubicBezTo>
+                  <a:pt x="3533554" y="1414130"/>
+                  <a:pt x="3529194" y="1427214"/>
+                  <a:pt x="3519377" y="1435395"/>
+                </a:cubicBezTo>
+                <a:cubicBezTo>
+                  <a:pt x="3507201" y="1445542"/>
+                  <a:pt x="3490609" y="1448797"/>
+                  <a:pt x="3476847" y="1456661"/>
+                </a:cubicBezTo>
+                <a:cubicBezTo>
+                  <a:pt x="3465752" y="1463001"/>
+                  <a:pt x="3455348" y="1470499"/>
+                  <a:pt x="3444949" y="1477926"/>
+                </a:cubicBezTo>
+                <a:cubicBezTo>
+                  <a:pt x="3430529" y="1488226"/>
+                  <a:pt x="3417805" y="1501031"/>
+                  <a:pt x="3402419" y="1509823"/>
+                </a:cubicBezTo>
+                <a:cubicBezTo>
+                  <a:pt x="3392688" y="1515384"/>
+                  <a:pt x="3380318" y="1515013"/>
+                  <a:pt x="3370521" y="1520456"/>
+                </a:cubicBezTo>
+                <a:cubicBezTo>
+                  <a:pt x="3348180" y="1532868"/>
+                  <a:pt x="3327991" y="1548809"/>
+                  <a:pt x="3306726" y="1562986"/>
+                </a:cubicBezTo>
+                <a:lnTo>
+                  <a:pt x="3274828" y="1584251"/>
+                </a:lnTo>
+                <a:cubicBezTo>
+                  <a:pt x="3264196" y="1591339"/>
+                  <a:pt x="3251967" y="1596480"/>
+                  <a:pt x="3242931" y="1605516"/>
+                </a:cubicBezTo>
+                <a:cubicBezTo>
+                  <a:pt x="3235843" y="1612605"/>
+                  <a:pt x="3230632" y="1622299"/>
+                  <a:pt x="3221666" y="1626782"/>
+                </a:cubicBezTo>
+                <a:cubicBezTo>
+                  <a:pt x="3221662" y="1626784"/>
+                  <a:pt x="3141925" y="1653362"/>
+                  <a:pt x="3125973" y="1658679"/>
+                </a:cubicBezTo>
+                <a:lnTo>
+                  <a:pt x="3062177" y="1679944"/>
+                </a:lnTo>
+                <a:cubicBezTo>
+                  <a:pt x="3051545" y="1683488"/>
+                  <a:pt x="3041270" y="1688379"/>
+                  <a:pt x="3030280" y="1690577"/>
+                </a:cubicBezTo>
+                <a:cubicBezTo>
+                  <a:pt x="2952542" y="1706124"/>
+                  <a:pt x="2995007" y="1698653"/>
+                  <a:pt x="2902689" y="1711842"/>
+                </a:cubicBezTo>
+                <a:cubicBezTo>
+                  <a:pt x="2881424" y="1726019"/>
+                  <a:pt x="2863139" y="1746290"/>
+                  <a:pt x="2838893" y="1754372"/>
+                </a:cubicBezTo>
+                <a:lnTo>
+                  <a:pt x="2679405" y="1807535"/>
+                </a:lnTo>
+                <a:lnTo>
+                  <a:pt x="2583712" y="1839433"/>
+                </a:lnTo>
+                <a:cubicBezTo>
+                  <a:pt x="2573079" y="1842977"/>
+                  <a:pt x="2562687" y="1847347"/>
+                  <a:pt x="2551814" y="1850065"/>
+                </a:cubicBezTo>
+                <a:cubicBezTo>
+                  <a:pt x="2537637" y="1853609"/>
+                  <a:pt x="2523335" y="1856684"/>
+                  <a:pt x="2509284" y="1860698"/>
+                </a:cubicBezTo>
+                <a:cubicBezTo>
+                  <a:pt x="2447143" y="1878452"/>
+                  <a:pt x="2509615" y="1865350"/>
+                  <a:pt x="2434856" y="1881963"/>
+                </a:cubicBezTo>
+                <a:cubicBezTo>
+                  <a:pt x="2417214" y="1885883"/>
+                  <a:pt x="2399719" y="1891307"/>
+                  <a:pt x="2381693" y="1892595"/>
+                </a:cubicBezTo>
+                <a:cubicBezTo>
+                  <a:pt x="2272754" y="1900376"/>
+                  <a:pt x="1872461" y="1911500"/>
+                  <a:pt x="1796903" y="1913861"/>
+                </a:cubicBezTo>
+                <a:cubicBezTo>
+                  <a:pt x="1782726" y="1917405"/>
+                  <a:pt x="1768424" y="1920479"/>
+                  <a:pt x="1754373" y="1924493"/>
+                </a:cubicBezTo>
+                <a:cubicBezTo>
+                  <a:pt x="1743596" y="1927572"/>
+                  <a:pt x="1733396" y="1932606"/>
+                  <a:pt x="1722475" y="1935126"/>
+                </a:cubicBezTo>
+                <a:cubicBezTo>
+                  <a:pt x="1569957" y="1970323"/>
+                  <a:pt x="1661354" y="1941323"/>
+                  <a:pt x="1584252" y="1967023"/>
+                </a:cubicBezTo>
+                <a:cubicBezTo>
+                  <a:pt x="1486850" y="1965113"/>
+                  <a:pt x="948702" y="1957968"/>
+                  <a:pt x="765545" y="1945758"/>
+                </a:cubicBezTo>
+                <a:cubicBezTo>
+                  <a:pt x="750964" y="1944786"/>
+                  <a:pt x="737392" y="1937740"/>
+                  <a:pt x="723014" y="1935126"/>
+                </a:cubicBezTo>
+                <a:cubicBezTo>
+                  <a:pt x="698357" y="1930643"/>
+                  <a:pt x="673161" y="1929408"/>
+                  <a:pt x="648586" y="1924493"/>
+                </a:cubicBezTo>
+                <a:cubicBezTo>
+                  <a:pt x="619928" y="1918761"/>
+                  <a:pt x="591879" y="1910316"/>
+                  <a:pt x="563526" y="1903228"/>
+                </a:cubicBezTo>
+                <a:cubicBezTo>
+                  <a:pt x="549349" y="1899684"/>
+                  <a:pt x="535559" y="1893808"/>
+                  <a:pt x="520996" y="1892595"/>
+                </a:cubicBezTo>
+                <a:lnTo>
+                  <a:pt x="393405" y="1881963"/>
+                </a:lnTo>
+                <a:cubicBezTo>
+                  <a:pt x="329125" y="1865892"/>
+                  <a:pt x="364745" y="1875953"/>
+                  <a:pt x="287080" y="1850065"/>
+                </a:cubicBezTo>
+                <a:lnTo>
+                  <a:pt x="255182" y="1839433"/>
+                </a:lnTo>
+                <a:lnTo>
+                  <a:pt x="191386" y="1796902"/>
+                </a:lnTo>
+                <a:lnTo>
+                  <a:pt x="159489" y="1775637"/>
+                </a:lnTo>
+                <a:cubicBezTo>
+                  <a:pt x="152401" y="1765005"/>
+                  <a:pt x="147260" y="1752776"/>
+                  <a:pt x="138224" y="1743740"/>
+                </a:cubicBezTo>
+                <a:cubicBezTo>
+                  <a:pt x="82956" y="1688473"/>
+                  <a:pt x="127151" y="1753823"/>
+                  <a:pt x="85061" y="1701209"/>
+                </a:cubicBezTo>
+                <a:cubicBezTo>
+                  <a:pt x="44433" y="1650423"/>
+                  <a:pt x="79367" y="1689822"/>
+                  <a:pt x="53163" y="1637414"/>
+                </a:cubicBezTo>
+                <a:cubicBezTo>
+                  <a:pt x="47448" y="1625984"/>
+                  <a:pt x="38986" y="1616149"/>
+                  <a:pt x="31898" y="1605516"/>
+                </a:cubicBezTo>
+                <a:lnTo>
+                  <a:pt x="10633" y="1541721"/>
+                </a:lnTo>
+                <a:lnTo>
+                  <a:pt x="0" y="1509823"/>
+                </a:lnTo>
+                <a:cubicBezTo>
+                  <a:pt x="3544" y="1485014"/>
+                  <a:pt x="9070" y="1460407"/>
+                  <a:pt x="10633" y="1435395"/>
+                </a:cubicBezTo>
+                <a:cubicBezTo>
+                  <a:pt x="16165" y="1346893"/>
+                  <a:pt x="12724" y="1257845"/>
+                  <a:pt x="21266" y="1169582"/>
+                </a:cubicBezTo>
+                <a:cubicBezTo>
+                  <a:pt x="23425" y="1147271"/>
+                  <a:pt x="42531" y="1105786"/>
+                  <a:pt x="42531" y="1105786"/>
+                </a:cubicBezTo>
+                <a:cubicBezTo>
+                  <a:pt x="46075" y="1063256"/>
+                  <a:pt x="41741" y="1019316"/>
+                  <a:pt x="53163" y="978195"/>
+                </a:cubicBezTo>
+                <a:cubicBezTo>
+                  <a:pt x="60003" y="953570"/>
+                  <a:pt x="87611" y="938646"/>
+                  <a:pt x="95693" y="914400"/>
+                </a:cubicBezTo>
+                <a:cubicBezTo>
+                  <a:pt x="99237" y="903767"/>
+                  <a:pt x="99324" y="891254"/>
+                  <a:pt x="106326" y="882502"/>
+                </a:cubicBezTo>
+                <a:cubicBezTo>
+                  <a:pt x="114309" y="872523"/>
+                  <a:pt x="127591" y="868325"/>
+                  <a:pt x="138224" y="861237"/>
+                </a:cubicBezTo>
+                <a:cubicBezTo>
+                  <a:pt x="151097" y="822615"/>
+                  <a:pt x="127591" y="829339"/>
+                  <a:pt x="148856" y="818707"/>
+                </a:cubicBezTo>
+                <a:close/>
+              </a:path>
+            </a:pathLst>
+          </a:custGeom>
+          <a:solidFill>
+            <a:schemeClr val="accent4">
+              <a:lumMod val="60000"/>
+              <a:lumOff val="40000"/>
+            </a:schemeClr>
+          </a:solidFill>
+          <a:ln w="28575">
+            <a:prstDash val="dash"/>
+          </a:ln>
+        </p:spPr>
+        <p:style>
+          <a:lnRef idx="2">
+            <a:schemeClr val="accent1">
+              <a:shade val="50000"/>
+            </a:schemeClr>
+          </a:lnRef>
+          <a:fillRef idx="1">
+            <a:schemeClr val="accent1"/>
+          </a:fillRef>
+          <a:effectRef idx="0">
+            <a:schemeClr val="accent1"/>
+          </a:effectRef>
+          <a:fontRef idx="minor">
+            <a:schemeClr val="lt1"/>
+          </a:fontRef>
+        </p:style>
+        <p:txBody>
+          <a:bodyPr rtlCol="0" anchor="ctr"/>
+          <a:lstStyle/>
+          <a:p>
+            <a:pPr algn="ctr"/>
+            <a:endParaRPr lang="pt-BR"/>
+          </a:p>
+        </p:txBody>
+      </p:sp>
+      <p:sp>
+        <p:nvSpPr>
+          <p:cNvPr id="52" name="Retângulo 51"/>
+          <p:cNvSpPr/>
+          <p:nvPr/>
+        </p:nvSpPr>
+        <p:spPr>
+          <a:xfrm>
+            <a:off x="4884023" y="5666928"/>
+            <a:ext cx="1200145" cy="570384"/>
           </a:xfrm>
           <a:prstGeom prst="rect">
             <a:avLst/>
           </a:prstGeom>
+          <a:solidFill>
+            <a:srgbClr val="00B050"/>
+          </a:solidFill>
+          <a:ln>
+            <a:solidFill>
+              <a:schemeClr val="tx1"/>
+            </a:solidFill>
+          </a:ln>
+          <a:effectLst/>
         </p:spPr>
         <p:style>
           <a:lnRef idx="2">
@@ -3133,11 +5258,23 @@
             <a:pPr algn="ctr"/>
             <a:r>
               <a:rPr lang="pt-BR" sz="1050" dirty="0" err="1" smtClean="0"/>
-              <a:t>buildComparable</a:t>
+              <a:t>States</a:t>
             </a:r>
             <a:r>
               <a:rPr lang="pt-BR" sz="1050" dirty="0" smtClean="0"/>
-              <a:t>*</a:t>
+              <a:t>, </a:t>
+            </a:r>
+            <a:r>
+              <a:rPr lang="pt-BR" sz="1050" dirty="0" err="1" smtClean="0"/>
+              <a:t>municipalities</a:t>
+            </a:r>
+            <a:r>
+              <a:rPr lang="pt-BR" sz="1050" dirty="0" smtClean="0"/>
+              <a:t>,  </a:t>
+            </a:r>
+            <a:r>
+              <a:rPr lang="pt-BR" sz="1050" dirty="0" err="1" smtClean="0"/>
+              <a:t>simu</a:t>
             </a:r>
             <a:endParaRPr lang="pt-BR" sz="1050" dirty="0"/>
           </a:p>
@@ -3145,18 +5282,27 @@
       </p:sp>
       <p:sp>
         <p:nvSpPr>
-          <p:cNvPr id="5" name="Retângulo 4"/>
+          <p:cNvPr id="48" name="Retângulo 47"/>
           <p:cNvSpPr/>
           <p:nvPr/>
         </p:nvSpPr>
         <p:spPr>
           <a:xfrm>
-            <a:off x="1141019" y="3171322"/>
-            <a:ext cx="838695" cy="288032"/>
+            <a:off x="2795791" y="2570584"/>
+            <a:ext cx="1200145" cy="570384"/>
           </a:xfrm>
           <a:prstGeom prst="rect">
             <a:avLst/>
           </a:prstGeom>
+          <a:solidFill>
+            <a:srgbClr val="00B050"/>
+          </a:solidFill>
+          <a:ln>
+            <a:solidFill>
+              <a:schemeClr val="tx1"/>
+            </a:solidFill>
+          </a:ln>
+          <a:effectLst/>
         </p:spPr>
         <p:style>
           <a:lnRef idx="2">
@@ -3180,12 +5326,32 @@
           <a:p>
             <a:pPr algn="ctr"/>
             <a:r>
+              <a:rPr lang="pt-BR" sz="1050" dirty="0" err="1" smtClean="0"/>
+              <a:t>Water</a:t>
+            </a:r>
+            <a:r>
               <a:rPr lang="pt-BR" sz="1050" dirty="0" smtClean="0"/>
-              <a:t>build*</a:t>
+              <a:t>, </a:t>
             </a:r>
             <a:r>
               <a:rPr lang="pt-BR" sz="1050" dirty="0" err="1" smtClean="0"/>
-              <a:t>Mask</a:t>
+              <a:t>Urban</a:t>
+            </a:r>
+            <a:r>
+              <a:rPr lang="pt-BR" sz="1050" dirty="0" smtClean="0"/>
+              <a:t> , </a:t>
+            </a:r>
+            <a:r>
+              <a:rPr lang="pt-BR" sz="1050" dirty="0" err="1" smtClean="0"/>
+              <a:t>Biome</a:t>
+            </a:r>
+            <a:r>
+              <a:rPr lang="pt-BR" sz="1050" dirty="0" smtClean="0"/>
+              <a:t>, </a:t>
+            </a:r>
+            <a:r>
+              <a:rPr lang="pt-BR" sz="1050" dirty="0" err="1" smtClean="0"/>
+              <a:t>Sugarcane</a:t>
             </a:r>
             <a:endParaRPr lang="pt-BR" sz="1050" dirty="0"/>
           </a:p>
@@ -3193,18 +5359,27 @@
       </p:sp>
       <p:sp>
         <p:nvSpPr>
-          <p:cNvPr id="6" name="Retângulo 5"/>
+          <p:cNvPr id="47" name="Retângulo 46"/>
           <p:cNvSpPr/>
           <p:nvPr/>
         </p:nvSpPr>
         <p:spPr>
           <a:xfrm>
-            <a:off x="5868147" y="2155461"/>
-            <a:ext cx="1604039" cy="288032"/>
+            <a:off x="5054790" y="1367714"/>
+            <a:ext cx="1200145" cy="570384"/>
           </a:xfrm>
           <a:prstGeom prst="rect">
             <a:avLst/>
           </a:prstGeom>
+          <a:solidFill>
+            <a:srgbClr val="00B050"/>
+          </a:solidFill>
+          <a:ln>
+            <a:solidFill>
+              <a:schemeClr val="tx1"/>
+            </a:solidFill>
+          </a:ln>
+          <a:effectLst/>
         </p:spPr>
         <p:style>
           <a:lnRef idx="2">
@@ -3229,15 +5404,27 @@
             <a:pPr algn="ctr"/>
             <a:r>
               <a:rPr lang="pt-BR" sz="1050" dirty="0" err="1" smtClean="0"/>
-              <a:t>diff</a:t>
+              <a:t>TerraClass</a:t>
             </a:r>
             <a:r>
               <a:rPr lang="pt-BR" sz="1050" dirty="0" smtClean="0"/>
-              <a:t>*</a:t>
+              <a:t>, PRODES </a:t>
             </a:r>
             <a:r>
               <a:rPr lang="pt-BR" sz="1050" dirty="0" err="1" smtClean="0"/>
-              <a:t>Comparable</a:t>
+              <a:t>Mask</a:t>
+            </a:r>
+            <a:r>
+              <a:rPr lang="pt-BR" sz="1050" dirty="0" smtClean="0"/>
+              <a:t>, </a:t>
+            </a:r>
+            <a:r>
+              <a:rPr lang="pt-BR" sz="1050" dirty="0" err="1" smtClean="0"/>
+              <a:t>Lapig</a:t>
+            </a:r>
+            <a:r>
+              <a:rPr lang="pt-BR" sz="1050" dirty="0" smtClean="0"/>
+              <a:t>, Hansen</a:t>
             </a:r>
             <a:endParaRPr lang="pt-BR" sz="1050" dirty="0"/>
           </a:p>
@@ -3245,18 +5432,24 @@
       </p:sp>
       <p:sp>
         <p:nvSpPr>
-          <p:cNvPr id="7" name="Retângulo 6"/>
+          <p:cNvPr id="4" name="Retângulo 3"/>
           <p:cNvSpPr/>
           <p:nvPr/>
         </p:nvSpPr>
         <p:spPr>
           <a:xfrm>
-            <a:off x="5874075" y="2897386"/>
-            <a:ext cx="1604039" cy="288032"/>
+            <a:off x="1931695" y="2011445"/>
+            <a:ext cx="1200145" cy="288032"/>
           </a:xfrm>
           <a:prstGeom prst="rect">
             <a:avLst/>
           </a:prstGeom>
+          <a:ln>
+            <a:solidFill>
+              <a:schemeClr val="tx1"/>
+            </a:solidFill>
+          </a:ln>
+          <a:effectLst/>
         </p:spPr>
         <p:style>
           <a:lnRef idx="2">
@@ -3281,34 +5474,36 @@
             <a:pPr algn="ctr"/>
             <a:r>
               <a:rPr lang="pt-BR" sz="1050" dirty="0" err="1" smtClean="0"/>
-              <a:t>map</a:t>
+              <a:t>buildComparable</a:t>
             </a:r>
             <a:r>
               <a:rPr lang="pt-BR" sz="1050" dirty="0" smtClean="0"/>
               <a:t>*</a:t>
             </a:r>
-            <a:r>
-              <a:rPr lang="pt-BR" sz="1050" dirty="0" err="1" smtClean="0"/>
-              <a:t>Comparable</a:t>
-            </a:r>
             <a:endParaRPr lang="pt-BR" sz="1050" dirty="0"/>
           </a:p>
         </p:txBody>
       </p:sp>
       <p:sp>
         <p:nvSpPr>
-          <p:cNvPr id="13" name="Retângulo 12"/>
+          <p:cNvPr id="5" name="Retângulo 4"/>
           <p:cNvSpPr/>
           <p:nvPr/>
         </p:nvSpPr>
         <p:spPr>
           <a:xfrm>
-            <a:off x="3086527" y="3699380"/>
-            <a:ext cx="909409" cy="288032"/>
+            <a:off x="1141019" y="3171322"/>
+            <a:ext cx="838695" cy="288032"/>
           </a:xfrm>
           <a:prstGeom prst="rect">
             <a:avLst/>
           </a:prstGeom>
+          <a:ln>
+            <a:solidFill>
+              <a:schemeClr val="tx1"/>
+            </a:solidFill>
+          </a:ln>
+          <a:effectLst/>
         </p:spPr>
         <p:style>
           <a:lnRef idx="2">
@@ -3332,6 +5527,176 @@
           <a:p>
             <a:pPr algn="ctr"/>
             <a:r>
+              <a:rPr lang="pt-BR" sz="1050" dirty="0" smtClean="0"/>
+              <a:t>build*</a:t>
+            </a:r>
+            <a:r>
+              <a:rPr lang="pt-BR" sz="1050" dirty="0" err="1" smtClean="0"/>
+              <a:t>Mask</a:t>
+            </a:r>
+            <a:endParaRPr lang="pt-BR" sz="1050" dirty="0"/>
+          </a:p>
+        </p:txBody>
+      </p:sp>
+      <p:sp>
+        <p:nvSpPr>
+          <p:cNvPr id="6" name="Retângulo 5"/>
+          <p:cNvSpPr/>
+          <p:nvPr/>
+        </p:nvSpPr>
+        <p:spPr>
+          <a:xfrm>
+            <a:off x="5868147" y="2155461"/>
+            <a:ext cx="1604039" cy="288032"/>
+          </a:xfrm>
+          <a:prstGeom prst="rect">
+            <a:avLst/>
+          </a:prstGeom>
+          <a:ln>
+            <a:solidFill>
+              <a:schemeClr val="tx1"/>
+            </a:solidFill>
+          </a:ln>
+          <a:effectLst/>
+        </p:spPr>
+        <p:style>
+          <a:lnRef idx="2">
+            <a:schemeClr val="accent6">
+              <a:shade val="50000"/>
+            </a:schemeClr>
+          </a:lnRef>
+          <a:fillRef idx="1">
+            <a:schemeClr val="accent6"/>
+          </a:fillRef>
+          <a:effectRef idx="0">
+            <a:schemeClr val="accent6"/>
+          </a:effectRef>
+          <a:fontRef idx="minor">
+            <a:schemeClr val="lt1"/>
+          </a:fontRef>
+        </p:style>
+        <p:txBody>
+          <a:bodyPr rtlCol="0" anchor="ctr"/>
+          <a:lstStyle/>
+          <a:p>
+            <a:pPr algn="ctr"/>
+            <a:r>
+              <a:rPr lang="pt-BR" sz="1050" dirty="0" err="1" smtClean="0"/>
+              <a:t>diff</a:t>
+            </a:r>
+            <a:r>
+              <a:rPr lang="pt-BR" sz="1050" dirty="0" smtClean="0"/>
+              <a:t>*</a:t>
+            </a:r>
+            <a:r>
+              <a:rPr lang="pt-BR" sz="1050" dirty="0" err="1" smtClean="0"/>
+              <a:t>Comparable</a:t>
+            </a:r>
+            <a:endParaRPr lang="pt-BR" sz="1050" dirty="0"/>
+          </a:p>
+        </p:txBody>
+      </p:sp>
+      <p:sp>
+        <p:nvSpPr>
+          <p:cNvPr id="7" name="Retângulo 6"/>
+          <p:cNvSpPr/>
+          <p:nvPr/>
+        </p:nvSpPr>
+        <p:spPr>
+          <a:xfrm>
+            <a:off x="5874075" y="2897386"/>
+            <a:ext cx="1604039" cy="288032"/>
+          </a:xfrm>
+          <a:prstGeom prst="rect">
+            <a:avLst/>
+          </a:prstGeom>
+          <a:ln>
+            <a:solidFill>
+              <a:schemeClr val="tx1"/>
+            </a:solidFill>
+          </a:ln>
+          <a:effectLst/>
+        </p:spPr>
+        <p:style>
+          <a:lnRef idx="2">
+            <a:schemeClr val="accent6">
+              <a:shade val="50000"/>
+            </a:schemeClr>
+          </a:lnRef>
+          <a:fillRef idx="1">
+            <a:schemeClr val="accent6"/>
+          </a:fillRef>
+          <a:effectRef idx="0">
+            <a:schemeClr val="accent6"/>
+          </a:effectRef>
+          <a:fontRef idx="minor">
+            <a:schemeClr val="lt1"/>
+          </a:fontRef>
+        </p:style>
+        <p:txBody>
+          <a:bodyPr rtlCol="0" anchor="ctr"/>
+          <a:lstStyle/>
+          <a:p>
+            <a:pPr algn="ctr"/>
+            <a:r>
+              <a:rPr lang="pt-BR" sz="1050" dirty="0" err="1" smtClean="0"/>
+              <a:t>map</a:t>
+            </a:r>
+            <a:r>
+              <a:rPr lang="pt-BR" sz="1050" dirty="0" smtClean="0"/>
+              <a:t>*</a:t>
+            </a:r>
+            <a:r>
+              <a:rPr lang="pt-BR" sz="1050" dirty="0" err="1" smtClean="0"/>
+              <a:t>Comparable</a:t>
+            </a:r>
+            <a:endParaRPr lang="pt-BR" sz="1050" dirty="0"/>
+          </a:p>
+        </p:txBody>
+      </p:sp>
+      <p:sp>
+        <p:nvSpPr>
+          <p:cNvPr id="13" name="Retângulo 12"/>
+          <p:cNvSpPr/>
+          <p:nvPr/>
+        </p:nvSpPr>
+        <p:spPr>
+          <a:xfrm>
+            <a:off x="3086527" y="3699380"/>
+            <a:ext cx="909409" cy="288032"/>
+          </a:xfrm>
+          <a:prstGeom prst="rect">
+            <a:avLst/>
+          </a:prstGeom>
+          <a:ln>
+            <a:solidFill>
+              <a:schemeClr val="tx1"/>
+            </a:solidFill>
+          </a:ln>
+          <a:effectLst/>
+        </p:spPr>
+        <p:style>
+          <a:lnRef idx="2">
+            <a:schemeClr val="accent6">
+              <a:shade val="50000"/>
+            </a:schemeClr>
+          </a:lnRef>
+          <a:fillRef idx="1">
+            <a:schemeClr val="accent6"/>
+          </a:fillRef>
+          <a:effectRef idx="0">
+            <a:schemeClr val="accent6"/>
+          </a:effectRef>
+          <a:fontRef idx="minor">
+            <a:schemeClr val="lt1"/>
+          </a:fontRef>
+        </p:style>
+        <p:txBody>
+          <a:bodyPr rtlCol="0" anchor="ctr"/>
+          <a:lstStyle/>
+          <a:p>
+            <a:pPr algn="ctr"/>
+            <a:r>
               <a:rPr lang="pt-BR" sz="1050" dirty="0" err="1" smtClean="0"/>
               <a:t>applyMasks</a:t>
             </a:r>
@@ -3385,11 +5750,7 @@
             </a:r>
             <a:r>
               <a:rPr lang="pt-BR" sz="1050" dirty="0" smtClean="0"/>
-              <a:t> </a:t>
-            </a:r>
-            <a:r>
-              <a:rPr lang="pt-BR" sz="1050" dirty="0" smtClean="0"/>
-              <a:t>data</a:t>
+              <a:t> data</a:t>
             </a:r>
             <a:endParaRPr lang="pt-BR" sz="1050" dirty="0"/>
           </a:p>
@@ -3413,8 +5774,9 @@
             <a:avLst/>
           </a:prstGeom>
           <a:ln w="25400">
-            <a:tailEnd type="arrow"/>
+            <a:tailEnd type="triangle"/>
           </a:ln>
+          <a:effectLst/>
         </p:spPr>
         <p:style>
           <a:lnRef idx="1">
@@ -3505,8 +5867,9 @@
             <a:avLst/>
           </a:prstGeom>
           <a:ln w="25400">
-            <a:tailEnd type="arrow"/>
+            <a:tailEnd type="triangle"/>
           </a:ln>
+          <a:effectLst/>
         </p:spPr>
         <p:style>
           <a:lnRef idx="1">
@@ -3589,6 +5952,12 @@
           <a:prstGeom prst="rect">
             <a:avLst/>
           </a:prstGeom>
+          <a:ln>
+            <a:solidFill>
+              <a:schemeClr val="tx1"/>
+            </a:solidFill>
+          </a:ln>
+          <a:effectLst/>
         </p:spPr>
         <p:style>
           <a:lnRef idx="2">
@@ -3637,8 +6006,9 @@
             <a:avLst/>
           </a:prstGeom>
           <a:ln w="25400">
-            <a:tailEnd type="arrow"/>
+            <a:tailEnd type="triangle"/>
           </a:ln>
+          <a:effectLst/>
         </p:spPr>
         <p:style>
           <a:lnRef idx="1">
@@ -3669,6 +6039,7 @@
           <a:prstGeom prst="can">
             <a:avLst/>
           </a:prstGeom>
+          <a:effectLst/>
         </p:spPr>
         <p:style>
           <a:lnRef idx="2">
@@ -3725,6 +6096,7 @@
           <a:prstGeom prst="can">
             <a:avLst/>
           </a:prstGeom>
+          <a:effectLst/>
         </p:spPr>
         <p:style>
           <a:lnRef idx="2">
@@ -3777,6 +6149,7 @@
           <a:prstGeom prst="can">
             <a:avLst/>
           </a:prstGeom>
+          <a:effectLst/>
         </p:spPr>
         <p:style>
           <a:lnRef idx="2">
@@ -3829,6 +6202,7 @@
           <a:prstGeom prst="can">
             <a:avLst/>
           </a:prstGeom>
+          <a:effectLst/>
         </p:spPr>
         <p:style>
           <a:lnRef idx="2">
@@ -3897,8 +6271,9 @@
             <a:avLst/>
           </a:prstGeom>
           <a:ln w="25400">
-            <a:tailEnd type="arrow"/>
+            <a:tailEnd type="triangle"/>
           </a:ln>
+          <a:effectLst/>
         </p:spPr>
         <p:style>
           <a:lnRef idx="1">
@@ -3933,8 +6308,9 @@
             <a:avLst/>
           </a:prstGeom>
           <a:ln w="25400">
-            <a:tailEnd type="arrow"/>
+            <a:tailEnd type="triangle"/>
           </a:ln>
+          <a:effectLst/>
         </p:spPr>
         <p:style>
           <a:lnRef idx="1">
@@ -3969,8 +6345,9 @@
             <a:avLst/>
           </a:prstGeom>
           <a:ln w="25400">
-            <a:tailEnd type="arrow"/>
+            <a:tailEnd type="triangle"/>
           </a:ln>
+          <a:effectLst/>
         </p:spPr>
         <p:style>
           <a:lnRef idx="1">
@@ -4005,8 +6382,9 @@
             <a:avLst/>
           </a:prstGeom>
           <a:ln w="25400">
-            <a:tailEnd type="arrow"/>
+            <a:tailEnd type="triangle"/>
           </a:ln>
+          <a:effectLst/>
         </p:spPr>
         <p:style>
           <a:lnRef idx="1">
@@ -4041,8 +6419,9 @@
             <a:avLst/>
           </a:prstGeom>
           <a:ln w="25400">
-            <a:tailEnd type="arrow"/>
+            <a:tailEnd type="triangle"/>
           </a:ln>
+          <a:effectLst/>
         </p:spPr>
         <p:style>
           <a:lnRef idx="1">
@@ -4076,8 +6455,9 @@
             <a:avLst/>
           </a:prstGeom>
           <a:ln w="25400">
-            <a:tailEnd type="arrow"/>
+            <a:tailEnd type="triangle"/>
           </a:ln>
+          <a:effectLst/>
         </p:spPr>
         <p:style>
           <a:lnRef idx="1">
@@ -4108,6 +6488,12 @@
           <a:prstGeom prst="rect">
             <a:avLst/>
           </a:prstGeom>
+          <a:ln>
+            <a:solidFill>
+              <a:schemeClr val="tx1"/>
+            </a:solidFill>
+          </a:ln>
+          <a:effectLst/>
         </p:spPr>
         <p:style>
           <a:lnRef idx="2">
@@ -4150,12 +6536,13 @@
         </p:nvSpPr>
         <p:spPr>
           <a:xfrm>
-            <a:off x="4327920" y="4965172"/>
+            <a:off x="4327920" y="5079711"/>
             <a:ext cx="885926" cy="768085"/>
           </a:xfrm>
           <a:prstGeom prst="can">
             <a:avLst/>
           </a:prstGeom>
+          <a:effectLst/>
         </p:spPr>
         <p:style>
           <a:lnRef idx="2">
@@ -4180,32 +6567,25 @@
             <a:pPr algn="ctr"/>
             <a:r>
               <a:rPr lang="pt-BR" sz="1050" dirty="0" err="1" smtClean="0"/>
-              <a:t>states</a:t>
+              <a:t>Shapes</a:t>
             </a:r>
             <a:endParaRPr lang="pt-BR" sz="1050" dirty="0"/>
           </a:p>
           <a:p>
             <a:pPr algn="ctr"/>
             <a:r>
-              <a:rPr lang="pt-BR" sz="1050" dirty="0" err="1"/>
-              <a:t>m</a:t>
-            </a:r>
-            <a:r>
               <a:rPr lang="pt-BR" sz="1050" dirty="0" err="1" smtClean="0"/>
-              <a:t>unicip</a:t>
+              <a:t>With</a:t>
             </a:r>
             <a:r>
               <a:rPr lang="pt-BR" sz="1050" dirty="0" smtClean="0"/>
-              <a:t>.</a:t>
-            </a:r>
-            <a:endParaRPr lang="pt-BR" sz="1050" dirty="0"/>
-          </a:p>
-          <a:p>
-            <a:pPr algn="ctr"/>
-            <a:r>
-              <a:rPr lang="pt-BR" sz="1050" dirty="0" smtClean="0"/>
-              <a:t>etc.</a:t>
-            </a:r>
+              <a:t> </a:t>
+            </a:r>
+            <a:r>
+              <a:rPr lang="pt-BR" sz="1050" dirty="0" err="1" smtClean="0"/>
+              <a:t>polygons</a:t>
+            </a:r>
+            <a:endParaRPr lang="pt-BR" sz="1050" dirty="0" smtClean="0"/>
           </a:p>
         </p:txBody>
       </p:sp>
@@ -4223,6 +6603,12 @@
           <a:prstGeom prst="rect">
             <a:avLst/>
           </a:prstGeom>
+          <a:ln>
+            <a:solidFill>
+              <a:schemeClr val="tx1"/>
+            </a:solidFill>
+          </a:ln>
+          <a:effectLst/>
         </p:spPr>
         <p:style>
           <a:lnRef idx="2">
@@ -4267,6 +6653,7 @@
           <a:prstGeom prst="can">
             <a:avLst/>
           </a:prstGeom>
+          <a:effectLst/>
         </p:spPr>
         <p:style>
           <a:lnRef idx="2">
@@ -4311,6 +6698,7 @@
           <a:prstGeom prst="can">
             <a:avLst/>
           </a:prstGeom>
+          <a:effectLst/>
         </p:spPr>
         <p:style>
           <a:lnRef idx="2">
@@ -4355,6 +6743,7 @@
           <a:prstGeom prst="can">
             <a:avLst/>
           </a:prstGeom>
+          <a:effectLst/>
         </p:spPr>
         <p:style>
           <a:lnRef idx="2">
@@ -4403,8 +6792,9 @@
             <a:avLst/>
           </a:prstGeom>
           <a:ln w="25400">
-            <a:tailEnd type="arrow"/>
+            <a:tailEnd type="triangle"/>
           </a:ln>
+          <a:effectLst/>
         </p:spPr>
         <p:style>
           <a:lnRef idx="1">
@@ -4439,8 +6829,9 @@
             <a:avLst/>
           </a:prstGeom>
           <a:ln w="25400">
-            <a:tailEnd type="arrow"/>
+            <a:tailEnd type="triangle"/>
           </a:ln>
+          <a:effectLst/>
         </p:spPr>
         <p:style>
           <a:lnRef idx="1">
@@ -4469,14 +6860,15 @@
         <p:spPr>
           <a:xfrm flipV="1">
             <a:off x="5213846" y="4581128"/>
-            <a:ext cx="660229" cy="768087"/>
+            <a:ext cx="660229" cy="882626"/>
           </a:xfrm>
           <a:prstGeom prst="straightConnector1">
             <a:avLst/>
           </a:prstGeom>
           <a:ln w="25400">
-            <a:tailEnd type="arrow"/>
+            <a:tailEnd type="triangle"/>
           </a:ln>
+          <a:effectLst/>
         </p:spPr>
         <p:style>
           <a:lnRef idx="1">
@@ -4511,8 +6903,9 @@
             <a:avLst/>
           </a:prstGeom>
           <a:ln w="25400">
-            <a:tailEnd type="arrow"/>
+            <a:tailEnd type="triangle"/>
           </a:ln>
+          <a:effectLst/>
         </p:spPr>
         <p:style>
           <a:lnRef idx="1">
@@ -4547,8 +6940,9 @@
             <a:avLst/>
           </a:prstGeom>
           <a:ln w="25400">
-            <a:tailEnd type="arrow"/>
+            <a:tailEnd type="triangle"/>
           </a:ln>
+          <a:effectLst/>
         </p:spPr>
         <p:style>
           <a:lnRef idx="1">
@@ -4583,8 +6977,9 @@
             <a:avLst/>
           </a:prstGeom>
           <a:ln w="25400">
-            <a:tailEnd type="arrow"/>
+            <a:tailEnd type="triangle"/>
           </a:ln>
+          <a:effectLst/>
         </p:spPr>
         <p:style>
           <a:lnRef idx="1">
@@ -4619,8 +7014,9 @@
             <a:avLst/>
           </a:prstGeom>
           <a:ln w="25400">
-            <a:tailEnd type="arrow"/>
+            <a:tailEnd type="triangle"/>
           </a:ln>
+          <a:effectLst/>
         </p:spPr>
         <p:style>
           <a:lnRef idx="1">
@@ -4655,8 +7051,9 @@
             <a:avLst/>
           </a:prstGeom>
           <a:ln w="25400">
-            <a:tailEnd type="arrow"/>
+            <a:tailEnd type="triangle"/>
           </a:ln>
+          <a:effectLst/>
         </p:spPr>
         <p:style>
           <a:lnRef idx="1">
@@ -4691,8 +7088,9 @@
             <a:avLst/>
           </a:prstGeom>
           <a:ln w="25400">
-            <a:tailEnd type="arrow"/>
+            <a:tailEnd type="triangle"/>
           </a:ln>
+          <a:effectLst/>
         </p:spPr>
         <p:style>
           <a:lnRef idx="1">
@@ -4727,8 +7125,9 @@
             <a:avLst/>
           </a:prstGeom>
           <a:ln w="25400">
-            <a:tailEnd type="arrow"/>
+            <a:tailEnd type="triangle"/>
           </a:ln>
+          <a:effectLst/>
         </p:spPr>
         <p:style>
           <a:lnRef idx="1">
@@ -4763,8 +7162,9 @@
             <a:avLst/>
           </a:prstGeom>
           <a:ln w="25400">
-            <a:tailEnd type="arrow"/>
+            <a:tailEnd type="triangle"/>
           </a:ln>
+          <a:effectLst/>
         </p:spPr>
         <p:style>
           <a:lnRef idx="1">
@@ -4799,8 +7199,9 @@
             <a:avLst/>
           </a:prstGeom>
           <a:ln w="25400">
-            <a:tailEnd type="arrow"/>
+            <a:tailEnd type="triangle"/>
           </a:ln>
+          <a:effectLst/>
         </p:spPr>
         <p:style>
           <a:lnRef idx="1">
@@ -4831,6 +7232,7 @@
           <a:prstGeom prst="can">
             <a:avLst/>
           </a:prstGeom>
+          <a:effectLst/>
         </p:spPr>
         <p:style>
           <a:lnRef idx="2">
@@ -4898,8 +7300,9 @@
             <a:avLst/>
           </a:prstGeom>
           <a:ln w="25400">
-            <a:tailEnd type="arrow"/>
+            <a:tailEnd type="triangle"/>
           </a:ln>
+          <a:effectLst/>
         </p:spPr>
         <p:style>
           <a:lnRef idx="1">
@@ -4930,6 +7333,12 @@
           <a:prstGeom prst="rect">
             <a:avLst/>
           </a:prstGeom>
+          <a:ln>
+            <a:solidFill>
+              <a:schemeClr val="tx1"/>
+            </a:solidFill>
+          </a:ln>
+          <a:effectLst/>
         </p:spPr>
         <p:style>
           <a:lnRef idx="2">
@@ -4953,8 +7362,12 @@
           <a:p>
             <a:pPr algn="ctr"/>
             <a:r>
+              <a:rPr lang="pt-BR" sz="1050" dirty="0" err="1"/>
+              <a:t>p</a:t>
+            </a:r>
+            <a:r>
               <a:rPr lang="pt-BR" sz="1050" dirty="0" err="1" smtClean="0"/>
-              <a:t>PostProcessing</a:t>
+              <a:t>ostProcessing</a:t>
             </a:r>
             <a:r>
               <a:rPr lang="pt-BR" sz="1050" dirty="0" smtClean="0"/>
@@ -4982,8 +7395,9 @@
             <a:avLst/>
           </a:prstGeom>
           <a:ln w="25400">
-            <a:tailEnd type="arrow"/>
+            <a:tailEnd type="triangle"/>
           </a:ln>
+          <a:effectLst/>
         </p:spPr>
         <p:style>
           <a:lnRef idx="1">
@@ -5024,8 +7438,9 @@
             <a:solidFill>
               <a:schemeClr val="accent2"/>
             </a:solidFill>
-            <a:tailEnd type="arrow"/>
+            <a:tailEnd type="triangle"/>
           </a:ln>
+          <a:effectLst/>
         </p:spPr>
         <p:style>
           <a:lnRef idx="1">

</xml_diff>

<commit_message>
Fixing small bug that allowed the amount of water to change along time.
</commit_message>
<xml_diff>
--- a/inst/extdata/sits-validate-diagram.pptx
+++ b/inst/extdata/sits-validate-diagram.pptx
@@ -288,7 +288,7 @@
           <a:p>
             <a:fld id="{347BC181-B323-4629-877A-602624B8B6C0}" type="datetimeFigureOut">
               <a:rPr lang="pt-BR" smtClean="0"/>
-              <a:t>17/09/2018</a:t>
+              <a:t>19/09/2018</a:t>
             </a:fld>
             <a:endParaRPr lang="pt-BR"/>
           </a:p>
@@ -458,7 +458,7 @@
           <a:p>
             <a:fld id="{347BC181-B323-4629-877A-602624B8B6C0}" type="datetimeFigureOut">
               <a:rPr lang="pt-BR" smtClean="0"/>
-              <a:t>17/09/2018</a:t>
+              <a:t>19/09/2018</a:t>
             </a:fld>
             <a:endParaRPr lang="pt-BR"/>
           </a:p>
@@ -638,7 +638,7 @@
           <a:p>
             <a:fld id="{347BC181-B323-4629-877A-602624B8B6C0}" type="datetimeFigureOut">
               <a:rPr lang="pt-BR" smtClean="0"/>
-              <a:t>17/09/2018</a:t>
+              <a:t>19/09/2018</a:t>
             </a:fld>
             <a:endParaRPr lang="pt-BR"/>
           </a:p>
@@ -808,7 +808,7 @@
           <a:p>
             <a:fld id="{347BC181-B323-4629-877A-602624B8B6C0}" type="datetimeFigureOut">
               <a:rPr lang="pt-BR" smtClean="0"/>
-              <a:t>17/09/2018</a:t>
+              <a:t>19/09/2018</a:t>
             </a:fld>
             <a:endParaRPr lang="pt-BR"/>
           </a:p>
@@ -1054,7 +1054,7 @@
           <a:p>
             <a:fld id="{347BC181-B323-4629-877A-602624B8B6C0}" type="datetimeFigureOut">
               <a:rPr lang="pt-BR" smtClean="0"/>
-              <a:t>17/09/2018</a:t>
+              <a:t>19/09/2018</a:t>
             </a:fld>
             <a:endParaRPr lang="pt-BR"/>
           </a:p>
@@ -1342,7 +1342,7 @@
           <a:p>
             <a:fld id="{347BC181-B323-4629-877A-602624B8B6C0}" type="datetimeFigureOut">
               <a:rPr lang="pt-BR" smtClean="0"/>
-              <a:t>17/09/2018</a:t>
+              <a:t>19/09/2018</a:t>
             </a:fld>
             <a:endParaRPr lang="pt-BR"/>
           </a:p>
@@ -1764,7 +1764,7 @@
           <a:p>
             <a:fld id="{347BC181-B323-4629-877A-602624B8B6C0}" type="datetimeFigureOut">
               <a:rPr lang="pt-BR" smtClean="0"/>
-              <a:t>17/09/2018</a:t>
+              <a:t>19/09/2018</a:t>
             </a:fld>
             <a:endParaRPr lang="pt-BR"/>
           </a:p>
@@ -1882,7 +1882,7 @@
           <a:p>
             <a:fld id="{347BC181-B323-4629-877A-602624B8B6C0}" type="datetimeFigureOut">
               <a:rPr lang="pt-BR" smtClean="0"/>
-              <a:t>17/09/2018</a:t>
+              <a:t>19/09/2018</a:t>
             </a:fld>
             <a:endParaRPr lang="pt-BR"/>
           </a:p>
@@ -1977,7 +1977,7 @@
           <a:p>
             <a:fld id="{347BC181-B323-4629-877A-602624B8B6C0}" type="datetimeFigureOut">
               <a:rPr lang="pt-BR" smtClean="0"/>
-              <a:t>17/09/2018</a:t>
+              <a:t>19/09/2018</a:t>
             </a:fld>
             <a:endParaRPr lang="pt-BR"/>
           </a:p>
@@ -2254,7 +2254,7 @@
           <a:p>
             <a:fld id="{347BC181-B323-4629-877A-602624B8B6C0}" type="datetimeFigureOut">
               <a:rPr lang="pt-BR" smtClean="0"/>
-              <a:t>17/09/2018</a:t>
+              <a:t>19/09/2018</a:t>
             </a:fld>
             <a:endParaRPr lang="pt-BR"/>
           </a:p>
@@ -2507,7 +2507,7 @@
           <a:p>
             <a:fld id="{347BC181-B323-4629-877A-602624B8B6C0}" type="datetimeFigureOut">
               <a:rPr lang="pt-BR" smtClean="0"/>
-              <a:t>17/09/2018</a:t>
+              <a:t>19/09/2018</a:t>
             </a:fld>
             <a:endParaRPr lang="pt-BR"/>
           </a:p>
@@ -2720,7 +2720,7 @@
           <a:p>
             <a:fld id="{347BC181-B323-4629-877A-602624B8B6C0}" type="datetimeFigureOut">
               <a:rPr lang="pt-BR" smtClean="0"/>
-              <a:t>17/09/2018</a:t>
+              <a:t>19/09/2018</a:t>
             </a:fld>
             <a:endParaRPr lang="pt-BR"/>
           </a:p>
@@ -5350,10 +5350,18 @@
               <a:t>, </a:t>
             </a:r>
             <a:r>
-              <a:rPr lang="pt-BR" sz="1050" dirty="0" err="1" smtClean="0"/>
+              <a:rPr lang="pt-BR" sz="1050" dirty="0" err="1" smtClean="0">
+                <a:solidFill>
+                  <a:srgbClr val="FF0000"/>
+                </a:solidFill>
+              </a:rPr>
               <a:t>Sugarcane</a:t>
             </a:r>
-            <a:endParaRPr lang="pt-BR" sz="1050" dirty="0"/>
+            <a:endParaRPr lang="pt-BR" sz="1050" dirty="0">
+              <a:solidFill>
+                <a:srgbClr val="FF0000"/>
+              </a:solidFill>
+            </a:endParaRPr>
           </a:p>
         </p:txBody>
       </p:sp>
@@ -5424,9 +5432,21 @@
             </a:r>
             <a:r>
               <a:rPr lang="pt-BR" sz="1050" dirty="0" smtClean="0"/>
-              <a:t>, Hansen</a:t>
-            </a:r>
-            <a:endParaRPr lang="pt-BR" sz="1050" dirty="0"/>
+              <a:t>, </a:t>
+            </a:r>
+            <a:r>
+              <a:rPr lang="pt-BR" sz="1050" dirty="0" smtClean="0">
+                <a:solidFill>
+                  <a:srgbClr val="FF0000"/>
+                </a:solidFill>
+              </a:rPr>
+              <a:t>Hansen</a:t>
+            </a:r>
+            <a:endParaRPr lang="pt-BR" sz="1050" dirty="0">
+              <a:solidFill>
+                <a:srgbClr val="FF0000"/>
+              </a:solidFill>
+            </a:endParaRPr>
           </a:p>
         </p:txBody>
       </p:sp>

</xml_diff>